<commit_message>
added Proteus simulation files
</commit_message>
<xml_diff>
--- a/Lab05/img/figures.pptx
+++ b/Lab05/img/figures.pptx
@@ -7,6 +7,7 @@
   <p:sldIdLst>
     <p:sldId id="256" r:id="rId2"/>
     <p:sldId id="257" r:id="rId3"/>
+    <p:sldId id="258" r:id="rId4"/>
   </p:sldIdLst>
   <p:sldSz cx="12192000" cy="6858000"/>
   <p:notesSz cx="6858000" cy="9144000"/>
@@ -260,7 +261,7 @@
           <a:p>
             <a:fld id="{BD561430-F9AC-4906-994E-5C3AE287D84C}" type="datetimeFigureOut">
               <a:rPr lang="en-US" smtClean="0"/>
-              <a:t>3/30/2021</a:t>
+              <a:t>3/31/2021</a:t>
             </a:fld>
             <a:endParaRPr lang="en-US"/>
           </a:p>
@@ -458,7 +459,7 @@
           <a:p>
             <a:fld id="{BD561430-F9AC-4906-994E-5C3AE287D84C}" type="datetimeFigureOut">
               <a:rPr lang="en-US" smtClean="0"/>
-              <a:t>3/30/2021</a:t>
+              <a:t>3/31/2021</a:t>
             </a:fld>
             <a:endParaRPr lang="en-US"/>
           </a:p>
@@ -666,7 +667,7 @@
           <a:p>
             <a:fld id="{BD561430-F9AC-4906-994E-5C3AE287D84C}" type="datetimeFigureOut">
               <a:rPr lang="en-US" smtClean="0"/>
-              <a:t>3/30/2021</a:t>
+              <a:t>3/31/2021</a:t>
             </a:fld>
             <a:endParaRPr lang="en-US"/>
           </a:p>
@@ -864,7 +865,7 @@
           <a:p>
             <a:fld id="{BD561430-F9AC-4906-994E-5C3AE287D84C}" type="datetimeFigureOut">
               <a:rPr lang="en-US" smtClean="0"/>
-              <a:t>3/30/2021</a:t>
+              <a:t>3/31/2021</a:t>
             </a:fld>
             <a:endParaRPr lang="en-US"/>
           </a:p>
@@ -1139,7 +1140,7 @@
           <a:p>
             <a:fld id="{BD561430-F9AC-4906-994E-5C3AE287D84C}" type="datetimeFigureOut">
               <a:rPr lang="en-US" smtClean="0"/>
-              <a:t>3/30/2021</a:t>
+              <a:t>3/31/2021</a:t>
             </a:fld>
             <a:endParaRPr lang="en-US"/>
           </a:p>
@@ -1404,7 +1405,7 @@
           <a:p>
             <a:fld id="{BD561430-F9AC-4906-994E-5C3AE287D84C}" type="datetimeFigureOut">
               <a:rPr lang="en-US" smtClean="0"/>
-              <a:t>3/30/2021</a:t>
+              <a:t>3/31/2021</a:t>
             </a:fld>
             <a:endParaRPr lang="en-US"/>
           </a:p>
@@ -1816,7 +1817,7 @@
           <a:p>
             <a:fld id="{BD561430-F9AC-4906-994E-5C3AE287D84C}" type="datetimeFigureOut">
               <a:rPr lang="en-US" smtClean="0"/>
-              <a:t>3/30/2021</a:t>
+              <a:t>3/31/2021</a:t>
             </a:fld>
             <a:endParaRPr lang="en-US"/>
           </a:p>
@@ -1957,7 +1958,7 @@
           <a:p>
             <a:fld id="{BD561430-F9AC-4906-994E-5C3AE287D84C}" type="datetimeFigureOut">
               <a:rPr lang="en-US" smtClean="0"/>
-              <a:t>3/30/2021</a:t>
+              <a:t>3/31/2021</a:t>
             </a:fld>
             <a:endParaRPr lang="en-US"/>
           </a:p>
@@ -2070,7 +2071,7 @@
           <a:p>
             <a:fld id="{BD561430-F9AC-4906-994E-5C3AE287D84C}" type="datetimeFigureOut">
               <a:rPr lang="en-US" smtClean="0"/>
-              <a:t>3/30/2021</a:t>
+              <a:t>3/31/2021</a:t>
             </a:fld>
             <a:endParaRPr lang="en-US"/>
           </a:p>
@@ -2381,7 +2382,7 @@
           <a:p>
             <a:fld id="{BD561430-F9AC-4906-994E-5C3AE287D84C}" type="datetimeFigureOut">
               <a:rPr lang="en-US" smtClean="0"/>
-              <a:t>3/30/2021</a:t>
+              <a:t>3/31/2021</a:t>
             </a:fld>
             <a:endParaRPr lang="en-US"/>
           </a:p>
@@ -2669,7 +2670,7 @@
           <a:p>
             <a:fld id="{BD561430-F9AC-4906-994E-5C3AE287D84C}" type="datetimeFigureOut">
               <a:rPr lang="en-US" smtClean="0"/>
-              <a:t>3/30/2021</a:t>
+              <a:t>3/31/2021</a:t>
             </a:fld>
             <a:endParaRPr lang="en-US"/>
           </a:p>
@@ -2910,7 +2911,7 @@
           <a:p>
             <a:fld id="{BD561430-F9AC-4906-994E-5C3AE287D84C}" type="datetimeFigureOut">
               <a:rPr lang="en-US" smtClean="0"/>
-              <a:t>3/30/2021</a:t>
+              <a:t>3/31/2021</a:t>
             </a:fld>
             <a:endParaRPr lang="en-US"/>
           </a:p>
@@ -6399,7 +6400,7 @@
               <a:p>
                 <a:pPr algn="ctr"/>
                 <a:r>
-                  <a:rPr lang="en-US">
+                  <a:rPr lang="en-US" dirty="0">
                     <a:latin typeface="Segoe UI Semibold" panose="020B0702040204020203" pitchFamily="34" charset="0"/>
                     <a:cs typeface="Segoe UI Semibold" panose="020B0702040204020203" pitchFamily="34" charset="0"/>
                   </a:rPr>
@@ -9858,6 +9859,4120 @@
 </p:sld>
 </file>
 
+<file path=ppt/slides/slide3.xml><?xml version="1.0" encoding="utf-8"?>
+<p:sld xmlns:a="http://schemas.openxmlformats.org/drawingml/2006/main" xmlns:r="http://schemas.openxmlformats.org/officeDocument/2006/relationships" xmlns:p="http://schemas.openxmlformats.org/presentationml/2006/main">
+  <p:cSld>
+    <p:spTree>
+      <p:nvGrpSpPr>
+        <p:cNvPr id="1" name=""/>
+        <p:cNvGrpSpPr/>
+        <p:nvPr/>
+      </p:nvGrpSpPr>
+      <p:grpSpPr>
+        <a:xfrm>
+          <a:off x="0" y="0"/>
+          <a:ext cx="0" cy="0"/>
+          <a:chOff x="0" y="0"/>
+          <a:chExt cx="0" cy="0"/>
+        </a:xfrm>
+      </p:grpSpPr>
+      <p:grpSp>
+        <p:nvGrpSpPr>
+          <p:cNvPr id="39" name="Group 38">
+            <a:extLst>
+              <a:ext uri="{FF2B5EF4-FFF2-40B4-BE49-F238E27FC236}">
+                <a16:creationId xmlns:a16="http://schemas.microsoft.com/office/drawing/2014/main" id="{FA568A81-4F6F-4796-BD06-FE3815A81F37}"/>
+              </a:ext>
+            </a:extLst>
+          </p:cNvPr>
+          <p:cNvGrpSpPr/>
+          <p:nvPr/>
+        </p:nvGrpSpPr>
+        <p:grpSpPr>
+          <a:xfrm>
+            <a:off x="3358002" y="198575"/>
+            <a:ext cx="1721278" cy="3437950"/>
+            <a:chOff x="2682840" y="325616"/>
+            <a:chExt cx="1765401" cy="3526078"/>
+          </a:xfrm>
+        </p:grpSpPr>
+        <p:grpSp>
+          <p:nvGrpSpPr>
+            <p:cNvPr id="40" name="Group 39">
+              <a:extLst>
+                <a:ext uri="{FF2B5EF4-FFF2-40B4-BE49-F238E27FC236}">
+                  <a16:creationId xmlns:a16="http://schemas.microsoft.com/office/drawing/2014/main" id="{A4AC3C9E-C82F-4F99-8C09-AEDB21BB2023}"/>
+                </a:ext>
+              </a:extLst>
+            </p:cNvPr>
+            <p:cNvGrpSpPr/>
+            <p:nvPr/>
+          </p:nvGrpSpPr>
+          <p:grpSpPr>
+            <a:xfrm>
+              <a:off x="3266460" y="2044987"/>
+              <a:ext cx="598159" cy="1719371"/>
+              <a:chOff x="1729839" y="2441280"/>
+              <a:chExt cx="598159" cy="1358900"/>
+            </a:xfrm>
+          </p:grpSpPr>
+          <p:sp>
+            <p:nvSpPr>
+              <p:cNvPr id="69" name="Rectangle 68">
+                <a:extLst>
+                  <a:ext uri="{FF2B5EF4-FFF2-40B4-BE49-F238E27FC236}">
+                    <a16:creationId xmlns:a16="http://schemas.microsoft.com/office/drawing/2014/main" id="{45D200B3-6A29-4EC0-A90A-58ABE4CDAFD5}"/>
+                  </a:ext>
+                </a:extLst>
+              </p:cNvPr>
+              <p:cNvSpPr/>
+              <p:nvPr/>
+            </p:nvSpPr>
+            <p:spPr>
+              <a:xfrm>
+                <a:off x="1729839" y="2441280"/>
+                <a:ext cx="91082" cy="1358900"/>
+              </a:xfrm>
+              <a:prstGeom prst="rect">
+                <a:avLst/>
+              </a:prstGeom>
+              <a:solidFill>
+                <a:schemeClr val="bg2">
+                  <a:lumMod val="90000"/>
+                </a:schemeClr>
+              </a:solidFill>
+              <a:ln>
+                <a:noFill/>
+              </a:ln>
+            </p:spPr>
+            <p:style>
+              <a:lnRef idx="2">
+                <a:schemeClr val="accent1">
+                  <a:shade val="50000"/>
+                </a:schemeClr>
+              </a:lnRef>
+              <a:fillRef idx="1">
+                <a:schemeClr val="accent1"/>
+              </a:fillRef>
+              <a:effectRef idx="0">
+                <a:schemeClr val="accent1"/>
+              </a:effectRef>
+              <a:fontRef idx="minor">
+                <a:schemeClr val="lt1"/>
+              </a:fontRef>
+            </p:style>
+            <p:txBody>
+              <a:bodyPr rtlCol="0" anchor="ctr"/>
+              <a:lstStyle/>
+              <a:p>
+                <a:pPr algn="ctr"/>
+                <a:endParaRPr lang="en-US"/>
+              </a:p>
+            </p:txBody>
+          </p:sp>
+          <p:sp>
+            <p:nvSpPr>
+              <p:cNvPr id="70" name="Rectangle 69">
+                <a:extLst>
+                  <a:ext uri="{FF2B5EF4-FFF2-40B4-BE49-F238E27FC236}">
+                    <a16:creationId xmlns:a16="http://schemas.microsoft.com/office/drawing/2014/main" id="{92B350F8-DC81-426A-9BB9-BD2DA885B7D6}"/>
+                  </a:ext>
+                </a:extLst>
+              </p:cNvPr>
+              <p:cNvSpPr/>
+              <p:nvPr/>
+            </p:nvSpPr>
+            <p:spPr>
+              <a:xfrm>
+                <a:off x="1752521" y="2441280"/>
+                <a:ext cx="45719" cy="1358900"/>
+              </a:xfrm>
+              <a:prstGeom prst="rect">
+                <a:avLst/>
+              </a:prstGeom>
+              <a:solidFill>
+                <a:schemeClr val="bg1">
+                  <a:lumMod val="85000"/>
+                </a:schemeClr>
+              </a:solidFill>
+              <a:ln>
+                <a:noFill/>
+              </a:ln>
+            </p:spPr>
+            <p:style>
+              <a:lnRef idx="2">
+                <a:schemeClr val="accent1">
+                  <a:shade val="50000"/>
+                </a:schemeClr>
+              </a:lnRef>
+              <a:fillRef idx="1">
+                <a:schemeClr val="accent1"/>
+              </a:fillRef>
+              <a:effectRef idx="0">
+                <a:schemeClr val="accent1"/>
+              </a:effectRef>
+              <a:fontRef idx="minor">
+                <a:schemeClr val="lt1"/>
+              </a:fontRef>
+            </p:style>
+            <p:txBody>
+              <a:bodyPr rtlCol="0" anchor="ctr"/>
+              <a:lstStyle/>
+              <a:p>
+                <a:pPr algn="ctr"/>
+                <a:endParaRPr lang="en-US"/>
+              </a:p>
+            </p:txBody>
+          </p:sp>
+          <p:sp>
+            <p:nvSpPr>
+              <p:cNvPr id="71" name="Rectangle 70">
+                <a:extLst>
+                  <a:ext uri="{FF2B5EF4-FFF2-40B4-BE49-F238E27FC236}">
+                    <a16:creationId xmlns:a16="http://schemas.microsoft.com/office/drawing/2014/main" id="{F7B3A786-549F-4E60-BE09-A8834B63EBD4}"/>
+                  </a:ext>
+                </a:extLst>
+              </p:cNvPr>
+              <p:cNvSpPr/>
+              <p:nvPr/>
+            </p:nvSpPr>
+            <p:spPr>
+              <a:xfrm>
+                <a:off x="1800878" y="2441280"/>
+                <a:ext cx="91082" cy="1358900"/>
+              </a:xfrm>
+              <a:prstGeom prst="rect">
+                <a:avLst/>
+              </a:prstGeom>
+              <a:solidFill>
+                <a:schemeClr val="bg2">
+                  <a:lumMod val="90000"/>
+                </a:schemeClr>
+              </a:solidFill>
+              <a:ln>
+                <a:noFill/>
+              </a:ln>
+            </p:spPr>
+            <p:style>
+              <a:lnRef idx="2">
+                <a:schemeClr val="accent1">
+                  <a:shade val="50000"/>
+                </a:schemeClr>
+              </a:lnRef>
+              <a:fillRef idx="1">
+                <a:schemeClr val="accent1"/>
+              </a:fillRef>
+              <a:effectRef idx="0">
+                <a:schemeClr val="accent1"/>
+              </a:effectRef>
+              <a:fontRef idx="minor">
+                <a:schemeClr val="lt1"/>
+              </a:fontRef>
+            </p:style>
+            <p:txBody>
+              <a:bodyPr rtlCol="0" anchor="ctr"/>
+              <a:lstStyle/>
+              <a:p>
+                <a:pPr algn="ctr"/>
+                <a:endParaRPr lang="en-US"/>
+              </a:p>
+            </p:txBody>
+          </p:sp>
+          <p:sp>
+            <p:nvSpPr>
+              <p:cNvPr id="72" name="Rectangle 71">
+                <a:extLst>
+                  <a:ext uri="{FF2B5EF4-FFF2-40B4-BE49-F238E27FC236}">
+                    <a16:creationId xmlns:a16="http://schemas.microsoft.com/office/drawing/2014/main" id="{170AF19A-D32E-491C-BC04-EEE988EA0DAE}"/>
+                  </a:ext>
+                </a:extLst>
+              </p:cNvPr>
+              <p:cNvSpPr/>
+              <p:nvPr/>
+            </p:nvSpPr>
+            <p:spPr>
+              <a:xfrm>
+                <a:off x="1823560" y="2441280"/>
+                <a:ext cx="45719" cy="1358900"/>
+              </a:xfrm>
+              <a:prstGeom prst="rect">
+                <a:avLst/>
+              </a:prstGeom>
+              <a:solidFill>
+                <a:schemeClr val="bg1">
+                  <a:lumMod val="85000"/>
+                </a:schemeClr>
+              </a:solidFill>
+              <a:ln>
+                <a:noFill/>
+              </a:ln>
+            </p:spPr>
+            <p:style>
+              <a:lnRef idx="2">
+                <a:schemeClr val="accent1">
+                  <a:shade val="50000"/>
+                </a:schemeClr>
+              </a:lnRef>
+              <a:fillRef idx="1">
+                <a:schemeClr val="accent1"/>
+              </a:fillRef>
+              <a:effectRef idx="0">
+                <a:schemeClr val="accent1"/>
+              </a:effectRef>
+              <a:fontRef idx="minor">
+                <a:schemeClr val="lt1"/>
+              </a:fontRef>
+            </p:style>
+            <p:txBody>
+              <a:bodyPr rtlCol="0" anchor="ctr"/>
+              <a:lstStyle/>
+              <a:p>
+                <a:pPr algn="ctr"/>
+                <a:endParaRPr lang="en-US"/>
+              </a:p>
+            </p:txBody>
+          </p:sp>
+          <p:sp>
+            <p:nvSpPr>
+              <p:cNvPr id="73" name="Rectangle 72">
+                <a:extLst>
+                  <a:ext uri="{FF2B5EF4-FFF2-40B4-BE49-F238E27FC236}">
+                    <a16:creationId xmlns:a16="http://schemas.microsoft.com/office/drawing/2014/main" id="{CDEF5F91-7692-4962-B362-669D42D619C9}"/>
+                  </a:ext>
+                </a:extLst>
+              </p:cNvPr>
+              <p:cNvSpPr/>
+              <p:nvPr/>
+            </p:nvSpPr>
+            <p:spPr>
+              <a:xfrm>
+                <a:off x="1876819" y="2441280"/>
+                <a:ext cx="91082" cy="1358900"/>
+              </a:xfrm>
+              <a:prstGeom prst="rect">
+                <a:avLst/>
+              </a:prstGeom>
+              <a:solidFill>
+                <a:schemeClr val="bg2">
+                  <a:lumMod val="90000"/>
+                </a:schemeClr>
+              </a:solidFill>
+              <a:ln>
+                <a:noFill/>
+              </a:ln>
+            </p:spPr>
+            <p:style>
+              <a:lnRef idx="2">
+                <a:schemeClr val="accent1">
+                  <a:shade val="50000"/>
+                </a:schemeClr>
+              </a:lnRef>
+              <a:fillRef idx="1">
+                <a:schemeClr val="accent1"/>
+              </a:fillRef>
+              <a:effectRef idx="0">
+                <a:schemeClr val="accent1"/>
+              </a:effectRef>
+              <a:fontRef idx="minor">
+                <a:schemeClr val="lt1"/>
+              </a:fontRef>
+            </p:style>
+            <p:txBody>
+              <a:bodyPr rtlCol="0" anchor="ctr"/>
+              <a:lstStyle/>
+              <a:p>
+                <a:pPr algn="ctr"/>
+                <a:endParaRPr lang="en-US"/>
+              </a:p>
+            </p:txBody>
+          </p:sp>
+          <p:sp>
+            <p:nvSpPr>
+              <p:cNvPr id="74" name="Rectangle 73">
+                <a:extLst>
+                  <a:ext uri="{FF2B5EF4-FFF2-40B4-BE49-F238E27FC236}">
+                    <a16:creationId xmlns:a16="http://schemas.microsoft.com/office/drawing/2014/main" id="{A65C3302-63D6-4F1A-86DB-FC036665DED8}"/>
+                  </a:ext>
+                </a:extLst>
+              </p:cNvPr>
+              <p:cNvSpPr/>
+              <p:nvPr/>
+            </p:nvSpPr>
+            <p:spPr>
+              <a:xfrm>
+                <a:off x="1899501" y="2441280"/>
+                <a:ext cx="45719" cy="1358900"/>
+              </a:xfrm>
+              <a:prstGeom prst="rect">
+                <a:avLst/>
+              </a:prstGeom>
+              <a:solidFill>
+                <a:schemeClr val="bg1">
+                  <a:lumMod val="85000"/>
+                </a:schemeClr>
+              </a:solidFill>
+              <a:ln>
+                <a:noFill/>
+              </a:ln>
+            </p:spPr>
+            <p:style>
+              <a:lnRef idx="2">
+                <a:schemeClr val="accent1">
+                  <a:shade val="50000"/>
+                </a:schemeClr>
+              </a:lnRef>
+              <a:fillRef idx="1">
+                <a:schemeClr val="accent1"/>
+              </a:fillRef>
+              <a:effectRef idx="0">
+                <a:schemeClr val="accent1"/>
+              </a:effectRef>
+              <a:fontRef idx="minor">
+                <a:schemeClr val="lt1"/>
+              </a:fontRef>
+            </p:style>
+            <p:txBody>
+              <a:bodyPr rtlCol="0" anchor="ctr"/>
+              <a:lstStyle/>
+              <a:p>
+                <a:pPr algn="ctr"/>
+                <a:endParaRPr lang="en-US"/>
+              </a:p>
+            </p:txBody>
+          </p:sp>
+          <p:sp>
+            <p:nvSpPr>
+              <p:cNvPr id="75" name="Rectangle 74">
+                <a:extLst>
+                  <a:ext uri="{FF2B5EF4-FFF2-40B4-BE49-F238E27FC236}">
+                    <a16:creationId xmlns:a16="http://schemas.microsoft.com/office/drawing/2014/main" id="{909569AF-63D6-47B0-A43C-ACCD1A338975}"/>
+                  </a:ext>
+                </a:extLst>
+              </p:cNvPr>
+              <p:cNvSpPr/>
+              <p:nvPr/>
+            </p:nvSpPr>
+            <p:spPr>
+              <a:xfrm>
+                <a:off x="1947858" y="2441280"/>
+                <a:ext cx="91082" cy="1358900"/>
+              </a:xfrm>
+              <a:prstGeom prst="rect">
+                <a:avLst/>
+              </a:prstGeom>
+              <a:solidFill>
+                <a:schemeClr val="bg2">
+                  <a:lumMod val="90000"/>
+                </a:schemeClr>
+              </a:solidFill>
+              <a:ln>
+                <a:noFill/>
+              </a:ln>
+            </p:spPr>
+            <p:style>
+              <a:lnRef idx="2">
+                <a:schemeClr val="accent1">
+                  <a:shade val="50000"/>
+                </a:schemeClr>
+              </a:lnRef>
+              <a:fillRef idx="1">
+                <a:schemeClr val="accent1"/>
+              </a:fillRef>
+              <a:effectRef idx="0">
+                <a:schemeClr val="accent1"/>
+              </a:effectRef>
+              <a:fontRef idx="minor">
+                <a:schemeClr val="lt1"/>
+              </a:fontRef>
+            </p:style>
+            <p:txBody>
+              <a:bodyPr rtlCol="0" anchor="ctr"/>
+              <a:lstStyle/>
+              <a:p>
+                <a:pPr algn="ctr"/>
+                <a:endParaRPr lang="en-US"/>
+              </a:p>
+            </p:txBody>
+          </p:sp>
+          <p:sp>
+            <p:nvSpPr>
+              <p:cNvPr id="76" name="Rectangle 75">
+                <a:extLst>
+                  <a:ext uri="{FF2B5EF4-FFF2-40B4-BE49-F238E27FC236}">
+                    <a16:creationId xmlns:a16="http://schemas.microsoft.com/office/drawing/2014/main" id="{1178628B-3BFE-442D-909B-DED282FF927D}"/>
+                  </a:ext>
+                </a:extLst>
+              </p:cNvPr>
+              <p:cNvSpPr/>
+              <p:nvPr/>
+            </p:nvSpPr>
+            <p:spPr>
+              <a:xfrm>
+                <a:off x="1970540" y="2441280"/>
+                <a:ext cx="45719" cy="1358900"/>
+              </a:xfrm>
+              <a:prstGeom prst="rect">
+                <a:avLst/>
+              </a:prstGeom>
+              <a:solidFill>
+                <a:schemeClr val="bg1">
+                  <a:lumMod val="85000"/>
+                </a:schemeClr>
+              </a:solidFill>
+              <a:ln>
+                <a:noFill/>
+              </a:ln>
+            </p:spPr>
+            <p:style>
+              <a:lnRef idx="2">
+                <a:schemeClr val="accent1">
+                  <a:shade val="50000"/>
+                </a:schemeClr>
+              </a:lnRef>
+              <a:fillRef idx="1">
+                <a:schemeClr val="accent1"/>
+              </a:fillRef>
+              <a:effectRef idx="0">
+                <a:schemeClr val="accent1"/>
+              </a:effectRef>
+              <a:fontRef idx="minor">
+                <a:schemeClr val="lt1"/>
+              </a:fontRef>
+            </p:style>
+            <p:txBody>
+              <a:bodyPr rtlCol="0" anchor="ctr"/>
+              <a:lstStyle/>
+              <a:p>
+                <a:pPr algn="ctr"/>
+                <a:endParaRPr lang="en-US"/>
+              </a:p>
+            </p:txBody>
+          </p:sp>
+          <p:sp>
+            <p:nvSpPr>
+              <p:cNvPr id="77" name="Rectangle 76">
+                <a:extLst>
+                  <a:ext uri="{FF2B5EF4-FFF2-40B4-BE49-F238E27FC236}">
+                    <a16:creationId xmlns:a16="http://schemas.microsoft.com/office/drawing/2014/main" id="{2A8C8673-80B4-4BD2-8B6C-0598B6A3F843}"/>
+                  </a:ext>
+                </a:extLst>
+              </p:cNvPr>
+              <p:cNvSpPr/>
+              <p:nvPr/>
+            </p:nvSpPr>
+            <p:spPr>
+              <a:xfrm>
+                <a:off x="2018897" y="2441280"/>
+                <a:ext cx="91082" cy="1358900"/>
+              </a:xfrm>
+              <a:prstGeom prst="rect">
+                <a:avLst/>
+              </a:prstGeom>
+              <a:solidFill>
+                <a:schemeClr val="bg2">
+                  <a:lumMod val="90000"/>
+                </a:schemeClr>
+              </a:solidFill>
+              <a:ln>
+                <a:noFill/>
+              </a:ln>
+            </p:spPr>
+            <p:style>
+              <a:lnRef idx="2">
+                <a:schemeClr val="accent1">
+                  <a:shade val="50000"/>
+                </a:schemeClr>
+              </a:lnRef>
+              <a:fillRef idx="1">
+                <a:schemeClr val="accent1"/>
+              </a:fillRef>
+              <a:effectRef idx="0">
+                <a:schemeClr val="accent1"/>
+              </a:effectRef>
+              <a:fontRef idx="minor">
+                <a:schemeClr val="lt1"/>
+              </a:fontRef>
+            </p:style>
+            <p:txBody>
+              <a:bodyPr rtlCol="0" anchor="ctr"/>
+              <a:lstStyle/>
+              <a:p>
+                <a:pPr algn="ctr"/>
+                <a:endParaRPr lang="en-US"/>
+              </a:p>
+            </p:txBody>
+          </p:sp>
+          <p:sp>
+            <p:nvSpPr>
+              <p:cNvPr id="78" name="Rectangle 77">
+                <a:extLst>
+                  <a:ext uri="{FF2B5EF4-FFF2-40B4-BE49-F238E27FC236}">
+                    <a16:creationId xmlns:a16="http://schemas.microsoft.com/office/drawing/2014/main" id="{8329F3AD-DB54-4538-A935-952330445DA6}"/>
+                  </a:ext>
+                </a:extLst>
+              </p:cNvPr>
+              <p:cNvSpPr/>
+              <p:nvPr/>
+            </p:nvSpPr>
+            <p:spPr>
+              <a:xfrm>
+                <a:off x="2041579" y="2441280"/>
+                <a:ext cx="45719" cy="1358900"/>
+              </a:xfrm>
+              <a:prstGeom prst="rect">
+                <a:avLst/>
+              </a:prstGeom>
+              <a:solidFill>
+                <a:schemeClr val="bg1">
+                  <a:lumMod val="85000"/>
+                </a:schemeClr>
+              </a:solidFill>
+              <a:ln>
+                <a:noFill/>
+              </a:ln>
+            </p:spPr>
+            <p:style>
+              <a:lnRef idx="2">
+                <a:schemeClr val="accent1">
+                  <a:shade val="50000"/>
+                </a:schemeClr>
+              </a:lnRef>
+              <a:fillRef idx="1">
+                <a:schemeClr val="accent1"/>
+              </a:fillRef>
+              <a:effectRef idx="0">
+                <a:schemeClr val="accent1"/>
+              </a:effectRef>
+              <a:fontRef idx="minor">
+                <a:schemeClr val="lt1"/>
+              </a:fontRef>
+            </p:style>
+            <p:txBody>
+              <a:bodyPr rtlCol="0" anchor="ctr"/>
+              <a:lstStyle/>
+              <a:p>
+                <a:pPr algn="ctr"/>
+                <a:endParaRPr lang="en-US"/>
+              </a:p>
+            </p:txBody>
+          </p:sp>
+          <p:sp>
+            <p:nvSpPr>
+              <p:cNvPr id="79" name="Rectangle 78">
+                <a:extLst>
+                  <a:ext uri="{FF2B5EF4-FFF2-40B4-BE49-F238E27FC236}">
+                    <a16:creationId xmlns:a16="http://schemas.microsoft.com/office/drawing/2014/main" id="{164E4150-5224-46D4-B4CB-DE63EDC4FD04}"/>
+                  </a:ext>
+                </a:extLst>
+              </p:cNvPr>
+              <p:cNvSpPr/>
+              <p:nvPr/>
+            </p:nvSpPr>
+            <p:spPr>
+              <a:xfrm>
+                <a:off x="2089936" y="2441280"/>
+                <a:ext cx="91082" cy="1358900"/>
+              </a:xfrm>
+              <a:prstGeom prst="rect">
+                <a:avLst/>
+              </a:prstGeom>
+              <a:solidFill>
+                <a:schemeClr val="bg2">
+                  <a:lumMod val="90000"/>
+                </a:schemeClr>
+              </a:solidFill>
+              <a:ln>
+                <a:noFill/>
+              </a:ln>
+            </p:spPr>
+            <p:style>
+              <a:lnRef idx="2">
+                <a:schemeClr val="accent1">
+                  <a:shade val="50000"/>
+                </a:schemeClr>
+              </a:lnRef>
+              <a:fillRef idx="1">
+                <a:schemeClr val="accent1"/>
+              </a:fillRef>
+              <a:effectRef idx="0">
+                <a:schemeClr val="accent1"/>
+              </a:effectRef>
+              <a:fontRef idx="minor">
+                <a:schemeClr val="lt1"/>
+              </a:fontRef>
+            </p:style>
+            <p:txBody>
+              <a:bodyPr rtlCol="0" anchor="ctr"/>
+              <a:lstStyle/>
+              <a:p>
+                <a:pPr algn="ctr"/>
+                <a:endParaRPr lang="en-US"/>
+              </a:p>
+            </p:txBody>
+          </p:sp>
+          <p:sp>
+            <p:nvSpPr>
+              <p:cNvPr id="80" name="Rectangle 79">
+                <a:extLst>
+                  <a:ext uri="{FF2B5EF4-FFF2-40B4-BE49-F238E27FC236}">
+                    <a16:creationId xmlns:a16="http://schemas.microsoft.com/office/drawing/2014/main" id="{E0EC0F25-1FAD-4BDC-B9A5-0FC96420FAE2}"/>
+                  </a:ext>
+                </a:extLst>
+              </p:cNvPr>
+              <p:cNvSpPr/>
+              <p:nvPr/>
+            </p:nvSpPr>
+            <p:spPr>
+              <a:xfrm>
+                <a:off x="2112618" y="2441280"/>
+                <a:ext cx="45719" cy="1358900"/>
+              </a:xfrm>
+              <a:prstGeom prst="rect">
+                <a:avLst/>
+              </a:prstGeom>
+              <a:solidFill>
+                <a:schemeClr val="bg1">
+                  <a:lumMod val="85000"/>
+                </a:schemeClr>
+              </a:solidFill>
+              <a:ln>
+                <a:noFill/>
+              </a:ln>
+            </p:spPr>
+            <p:style>
+              <a:lnRef idx="2">
+                <a:schemeClr val="accent1">
+                  <a:shade val="50000"/>
+                </a:schemeClr>
+              </a:lnRef>
+              <a:fillRef idx="1">
+                <a:schemeClr val="accent1"/>
+              </a:fillRef>
+              <a:effectRef idx="0">
+                <a:schemeClr val="accent1"/>
+              </a:effectRef>
+              <a:fontRef idx="minor">
+                <a:schemeClr val="lt1"/>
+              </a:fontRef>
+            </p:style>
+            <p:txBody>
+              <a:bodyPr rtlCol="0" anchor="ctr"/>
+              <a:lstStyle/>
+              <a:p>
+                <a:pPr algn="ctr"/>
+                <a:endParaRPr lang="en-US"/>
+              </a:p>
+            </p:txBody>
+          </p:sp>
+          <p:sp>
+            <p:nvSpPr>
+              <p:cNvPr id="81" name="Rectangle 80">
+                <a:extLst>
+                  <a:ext uri="{FF2B5EF4-FFF2-40B4-BE49-F238E27FC236}">
+                    <a16:creationId xmlns:a16="http://schemas.microsoft.com/office/drawing/2014/main" id="{E621F4D0-E23F-4705-A534-8580CAA9E248}"/>
+                  </a:ext>
+                </a:extLst>
+              </p:cNvPr>
+              <p:cNvSpPr/>
+              <p:nvPr/>
+            </p:nvSpPr>
+            <p:spPr>
+              <a:xfrm>
+                <a:off x="2165877" y="2441280"/>
+                <a:ext cx="91082" cy="1358900"/>
+              </a:xfrm>
+              <a:prstGeom prst="rect">
+                <a:avLst/>
+              </a:prstGeom>
+              <a:solidFill>
+                <a:schemeClr val="bg2">
+                  <a:lumMod val="90000"/>
+                </a:schemeClr>
+              </a:solidFill>
+              <a:ln>
+                <a:noFill/>
+              </a:ln>
+            </p:spPr>
+            <p:style>
+              <a:lnRef idx="2">
+                <a:schemeClr val="accent1">
+                  <a:shade val="50000"/>
+                </a:schemeClr>
+              </a:lnRef>
+              <a:fillRef idx="1">
+                <a:schemeClr val="accent1"/>
+              </a:fillRef>
+              <a:effectRef idx="0">
+                <a:schemeClr val="accent1"/>
+              </a:effectRef>
+              <a:fontRef idx="minor">
+                <a:schemeClr val="lt1"/>
+              </a:fontRef>
+            </p:style>
+            <p:txBody>
+              <a:bodyPr rtlCol="0" anchor="ctr"/>
+              <a:lstStyle/>
+              <a:p>
+                <a:pPr algn="ctr"/>
+                <a:endParaRPr lang="en-US"/>
+              </a:p>
+            </p:txBody>
+          </p:sp>
+          <p:sp>
+            <p:nvSpPr>
+              <p:cNvPr id="82" name="Rectangle 81">
+                <a:extLst>
+                  <a:ext uri="{FF2B5EF4-FFF2-40B4-BE49-F238E27FC236}">
+                    <a16:creationId xmlns:a16="http://schemas.microsoft.com/office/drawing/2014/main" id="{0AA56FE6-5E4A-4DFC-9B8A-10509DB00939}"/>
+                  </a:ext>
+                </a:extLst>
+              </p:cNvPr>
+              <p:cNvSpPr/>
+              <p:nvPr/>
+            </p:nvSpPr>
+            <p:spPr>
+              <a:xfrm>
+                <a:off x="2188559" y="2441280"/>
+                <a:ext cx="45719" cy="1358900"/>
+              </a:xfrm>
+              <a:prstGeom prst="rect">
+                <a:avLst/>
+              </a:prstGeom>
+              <a:solidFill>
+                <a:schemeClr val="bg1">
+                  <a:lumMod val="85000"/>
+                </a:schemeClr>
+              </a:solidFill>
+              <a:ln>
+                <a:noFill/>
+              </a:ln>
+            </p:spPr>
+            <p:style>
+              <a:lnRef idx="2">
+                <a:schemeClr val="accent1">
+                  <a:shade val="50000"/>
+                </a:schemeClr>
+              </a:lnRef>
+              <a:fillRef idx="1">
+                <a:schemeClr val="accent1"/>
+              </a:fillRef>
+              <a:effectRef idx="0">
+                <a:schemeClr val="accent1"/>
+              </a:effectRef>
+              <a:fontRef idx="minor">
+                <a:schemeClr val="lt1"/>
+              </a:fontRef>
+            </p:style>
+            <p:txBody>
+              <a:bodyPr rtlCol="0" anchor="ctr"/>
+              <a:lstStyle/>
+              <a:p>
+                <a:pPr algn="ctr"/>
+                <a:endParaRPr lang="en-US"/>
+              </a:p>
+            </p:txBody>
+          </p:sp>
+          <p:sp>
+            <p:nvSpPr>
+              <p:cNvPr id="83" name="Rectangle 82">
+                <a:extLst>
+                  <a:ext uri="{FF2B5EF4-FFF2-40B4-BE49-F238E27FC236}">
+                    <a16:creationId xmlns:a16="http://schemas.microsoft.com/office/drawing/2014/main" id="{2E312F74-E80F-4E83-B182-7C99CCA5AF4C}"/>
+                  </a:ext>
+                </a:extLst>
+              </p:cNvPr>
+              <p:cNvSpPr/>
+              <p:nvPr/>
+            </p:nvSpPr>
+            <p:spPr>
+              <a:xfrm>
+                <a:off x="2236916" y="2441280"/>
+                <a:ext cx="91082" cy="1358900"/>
+              </a:xfrm>
+              <a:prstGeom prst="rect">
+                <a:avLst/>
+              </a:prstGeom>
+              <a:solidFill>
+                <a:schemeClr val="bg2">
+                  <a:lumMod val="90000"/>
+                </a:schemeClr>
+              </a:solidFill>
+              <a:ln>
+                <a:noFill/>
+              </a:ln>
+            </p:spPr>
+            <p:style>
+              <a:lnRef idx="2">
+                <a:schemeClr val="accent1">
+                  <a:shade val="50000"/>
+                </a:schemeClr>
+              </a:lnRef>
+              <a:fillRef idx="1">
+                <a:schemeClr val="accent1"/>
+              </a:fillRef>
+              <a:effectRef idx="0">
+                <a:schemeClr val="accent1"/>
+              </a:effectRef>
+              <a:fontRef idx="minor">
+                <a:schemeClr val="lt1"/>
+              </a:fontRef>
+            </p:style>
+            <p:txBody>
+              <a:bodyPr rtlCol="0" anchor="ctr"/>
+              <a:lstStyle/>
+              <a:p>
+                <a:pPr algn="ctr"/>
+                <a:endParaRPr lang="en-US"/>
+              </a:p>
+            </p:txBody>
+          </p:sp>
+          <p:sp>
+            <p:nvSpPr>
+              <p:cNvPr id="84" name="Rectangle 83">
+                <a:extLst>
+                  <a:ext uri="{FF2B5EF4-FFF2-40B4-BE49-F238E27FC236}">
+                    <a16:creationId xmlns:a16="http://schemas.microsoft.com/office/drawing/2014/main" id="{84FC0895-6DD1-4FCB-A964-5A0D277EE6C5}"/>
+                  </a:ext>
+                </a:extLst>
+              </p:cNvPr>
+              <p:cNvSpPr/>
+              <p:nvPr/>
+            </p:nvSpPr>
+            <p:spPr>
+              <a:xfrm>
+                <a:off x="2259598" y="2441280"/>
+                <a:ext cx="45719" cy="1358900"/>
+              </a:xfrm>
+              <a:prstGeom prst="rect">
+                <a:avLst/>
+              </a:prstGeom>
+              <a:solidFill>
+                <a:schemeClr val="bg1">
+                  <a:lumMod val="85000"/>
+                </a:schemeClr>
+              </a:solidFill>
+              <a:ln>
+                <a:noFill/>
+              </a:ln>
+            </p:spPr>
+            <p:style>
+              <a:lnRef idx="2">
+                <a:schemeClr val="accent1">
+                  <a:shade val="50000"/>
+                </a:schemeClr>
+              </a:lnRef>
+              <a:fillRef idx="1">
+                <a:schemeClr val="accent1"/>
+              </a:fillRef>
+              <a:effectRef idx="0">
+                <a:schemeClr val="accent1"/>
+              </a:effectRef>
+              <a:fontRef idx="minor">
+                <a:schemeClr val="lt1"/>
+              </a:fontRef>
+            </p:style>
+            <p:txBody>
+              <a:bodyPr rtlCol="0" anchor="ctr"/>
+              <a:lstStyle/>
+              <a:p>
+                <a:pPr algn="ctr"/>
+                <a:endParaRPr lang="en-US"/>
+              </a:p>
+            </p:txBody>
+          </p:sp>
+        </p:grpSp>
+        <p:sp>
+          <p:nvSpPr>
+            <p:cNvPr id="41" name="Rectangle: Rounded Corners 40">
+              <a:extLst>
+                <a:ext uri="{FF2B5EF4-FFF2-40B4-BE49-F238E27FC236}">
+                  <a16:creationId xmlns:a16="http://schemas.microsoft.com/office/drawing/2014/main" id="{CB78074A-1E9D-46D3-A5FB-2A068A2C47F9}"/>
+                </a:ext>
+              </a:extLst>
+            </p:cNvPr>
+            <p:cNvSpPr/>
+            <p:nvPr/>
+          </p:nvSpPr>
+          <p:spPr>
+            <a:xfrm>
+              <a:off x="2682840" y="325616"/>
+              <a:ext cx="1765401" cy="1719371"/>
+            </a:xfrm>
+            <a:prstGeom prst="roundRect">
+              <a:avLst>
+                <a:gd name="adj" fmla="val 5718"/>
+              </a:avLst>
+            </a:prstGeom>
+            <a:solidFill>
+              <a:schemeClr val="bg2">
+                <a:lumMod val="25000"/>
+              </a:schemeClr>
+            </a:solidFill>
+            <a:ln>
+              <a:solidFill>
+                <a:schemeClr val="bg2">
+                  <a:lumMod val="10000"/>
+                </a:schemeClr>
+              </a:solidFill>
+            </a:ln>
+          </p:spPr>
+          <p:style>
+            <a:lnRef idx="2">
+              <a:schemeClr val="accent1">
+                <a:shade val="50000"/>
+              </a:schemeClr>
+            </a:lnRef>
+            <a:fillRef idx="1">
+              <a:schemeClr val="accent1"/>
+            </a:fillRef>
+            <a:effectRef idx="0">
+              <a:schemeClr val="accent1"/>
+            </a:effectRef>
+            <a:fontRef idx="minor">
+              <a:schemeClr val="lt1"/>
+            </a:fontRef>
+          </p:style>
+          <p:txBody>
+            <a:bodyPr rtlCol="0" anchor="ctr"/>
+            <a:lstStyle/>
+            <a:p>
+              <a:pPr algn="ctr"/>
+              <a:endParaRPr lang="en-US"/>
+            </a:p>
+          </p:txBody>
+        </p:sp>
+        <p:grpSp>
+          <p:nvGrpSpPr>
+            <p:cNvPr id="42" name="Group 41">
+              <a:extLst>
+                <a:ext uri="{FF2B5EF4-FFF2-40B4-BE49-F238E27FC236}">
+                  <a16:creationId xmlns:a16="http://schemas.microsoft.com/office/drawing/2014/main" id="{50CDAFFD-EEAC-4577-9027-D86C3CE4D1CE}"/>
+                </a:ext>
+              </a:extLst>
+            </p:cNvPr>
+            <p:cNvGrpSpPr/>
+            <p:nvPr/>
+          </p:nvGrpSpPr>
+          <p:grpSpPr>
+            <a:xfrm>
+              <a:off x="2764025" y="398418"/>
+              <a:ext cx="1603030" cy="1573766"/>
+              <a:chOff x="4438881" y="718535"/>
+              <a:chExt cx="1603030" cy="1573766"/>
+            </a:xfrm>
+          </p:grpSpPr>
+          <p:sp>
+            <p:nvSpPr>
+              <p:cNvPr id="53" name="Rectangle: Rounded Corners 52">
+                <a:extLst>
+                  <a:ext uri="{FF2B5EF4-FFF2-40B4-BE49-F238E27FC236}">
+                    <a16:creationId xmlns:a16="http://schemas.microsoft.com/office/drawing/2014/main" id="{9CF1CBA2-A8B3-47A6-8192-096A08AC2969}"/>
+                  </a:ext>
+                </a:extLst>
+              </p:cNvPr>
+              <p:cNvSpPr/>
+              <p:nvPr/>
+            </p:nvSpPr>
+            <p:spPr>
+              <a:xfrm>
+                <a:off x="4438881" y="718535"/>
+                <a:ext cx="363935" cy="363935"/>
+              </a:xfrm>
+              <a:prstGeom prst="roundRect">
+                <a:avLst>
+                  <a:gd name="adj" fmla="val 29753"/>
+                </a:avLst>
+              </a:prstGeom>
+              <a:ln>
+                <a:solidFill>
+                  <a:schemeClr val="bg2">
+                    <a:lumMod val="50000"/>
+                  </a:schemeClr>
+                </a:solidFill>
+              </a:ln>
+            </p:spPr>
+            <p:style>
+              <a:lnRef idx="2">
+                <a:schemeClr val="accent1">
+                  <a:shade val="50000"/>
+                </a:schemeClr>
+              </a:lnRef>
+              <a:fillRef idx="1">
+                <a:schemeClr val="accent1"/>
+              </a:fillRef>
+              <a:effectRef idx="0">
+                <a:schemeClr val="accent1"/>
+              </a:effectRef>
+              <a:fontRef idx="minor">
+                <a:schemeClr val="lt1"/>
+              </a:fontRef>
+            </p:style>
+            <p:txBody>
+              <a:bodyPr rtlCol="0" anchor="ctr"/>
+              <a:lstStyle/>
+              <a:p>
+                <a:pPr algn="ctr"/>
+                <a:r>
+                  <a:rPr lang="en-US">
+                    <a:latin typeface="Segoe UI Semibold" panose="020B0702040204020203" pitchFamily="34" charset="0"/>
+                    <a:cs typeface="Segoe UI Semibold" panose="020B0702040204020203" pitchFamily="34" charset="0"/>
+                  </a:rPr>
+                  <a:t>1</a:t>
+                </a:r>
+              </a:p>
+            </p:txBody>
+          </p:sp>
+          <p:sp>
+            <p:nvSpPr>
+              <p:cNvPr id="54" name="Rectangle: Rounded Corners 53">
+                <a:extLst>
+                  <a:ext uri="{FF2B5EF4-FFF2-40B4-BE49-F238E27FC236}">
+                    <a16:creationId xmlns:a16="http://schemas.microsoft.com/office/drawing/2014/main" id="{BCC2B3BE-7ED6-4119-85C4-1A3949826AB8}"/>
+                  </a:ext>
+                </a:extLst>
+              </p:cNvPr>
+              <p:cNvSpPr/>
+              <p:nvPr/>
+            </p:nvSpPr>
+            <p:spPr>
+              <a:xfrm>
+                <a:off x="4853145" y="718535"/>
+                <a:ext cx="363935" cy="363935"/>
+              </a:xfrm>
+              <a:prstGeom prst="roundRect">
+                <a:avLst>
+                  <a:gd name="adj" fmla="val 29753"/>
+                </a:avLst>
+              </a:prstGeom>
+              <a:ln>
+                <a:solidFill>
+                  <a:schemeClr val="bg2">
+                    <a:lumMod val="50000"/>
+                  </a:schemeClr>
+                </a:solidFill>
+              </a:ln>
+            </p:spPr>
+            <p:style>
+              <a:lnRef idx="2">
+                <a:schemeClr val="accent1">
+                  <a:shade val="50000"/>
+                </a:schemeClr>
+              </a:lnRef>
+              <a:fillRef idx="1">
+                <a:schemeClr val="accent1"/>
+              </a:fillRef>
+              <a:effectRef idx="0">
+                <a:schemeClr val="accent1"/>
+              </a:effectRef>
+              <a:fontRef idx="minor">
+                <a:schemeClr val="lt1"/>
+              </a:fontRef>
+            </p:style>
+            <p:txBody>
+              <a:bodyPr rtlCol="0" anchor="ctr"/>
+              <a:lstStyle/>
+              <a:p>
+                <a:pPr algn="ctr"/>
+                <a:r>
+                  <a:rPr lang="en-US">
+                    <a:latin typeface="Segoe UI Semibold" panose="020B0702040204020203" pitchFamily="34" charset="0"/>
+                    <a:cs typeface="Segoe UI Semibold" panose="020B0702040204020203" pitchFamily="34" charset="0"/>
+                  </a:rPr>
+                  <a:t>2</a:t>
+                </a:r>
+              </a:p>
+            </p:txBody>
+          </p:sp>
+          <p:sp>
+            <p:nvSpPr>
+              <p:cNvPr id="55" name="Rectangle: Rounded Corners 54">
+                <a:extLst>
+                  <a:ext uri="{FF2B5EF4-FFF2-40B4-BE49-F238E27FC236}">
+                    <a16:creationId xmlns:a16="http://schemas.microsoft.com/office/drawing/2014/main" id="{01551DDF-A993-405D-9BBA-4DAB2A901C90}"/>
+                  </a:ext>
+                </a:extLst>
+              </p:cNvPr>
+              <p:cNvSpPr/>
+              <p:nvPr/>
+            </p:nvSpPr>
+            <p:spPr>
+              <a:xfrm>
+                <a:off x="5263712" y="718535"/>
+                <a:ext cx="363935" cy="363935"/>
+              </a:xfrm>
+              <a:prstGeom prst="roundRect">
+                <a:avLst>
+                  <a:gd name="adj" fmla="val 29753"/>
+                </a:avLst>
+              </a:prstGeom>
+              <a:ln>
+                <a:solidFill>
+                  <a:schemeClr val="bg2">
+                    <a:lumMod val="50000"/>
+                  </a:schemeClr>
+                </a:solidFill>
+              </a:ln>
+            </p:spPr>
+            <p:style>
+              <a:lnRef idx="2">
+                <a:schemeClr val="accent1">
+                  <a:shade val="50000"/>
+                </a:schemeClr>
+              </a:lnRef>
+              <a:fillRef idx="1">
+                <a:schemeClr val="accent1"/>
+              </a:fillRef>
+              <a:effectRef idx="0">
+                <a:schemeClr val="accent1"/>
+              </a:effectRef>
+              <a:fontRef idx="minor">
+                <a:schemeClr val="lt1"/>
+              </a:fontRef>
+            </p:style>
+            <p:txBody>
+              <a:bodyPr rtlCol="0" anchor="ctr"/>
+              <a:lstStyle/>
+              <a:p>
+                <a:pPr algn="ctr"/>
+                <a:r>
+                  <a:rPr lang="en-US">
+                    <a:latin typeface="Segoe UI Semibold" panose="020B0702040204020203" pitchFamily="34" charset="0"/>
+                    <a:cs typeface="Segoe UI Semibold" panose="020B0702040204020203" pitchFamily="34" charset="0"/>
+                  </a:rPr>
+                  <a:t>3</a:t>
+                </a:r>
+              </a:p>
+            </p:txBody>
+          </p:sp>
+          <p:sp>
+            <p:nvSpPr>
+              <p:cNvPr id="56" name="Rectangle: Rounded Corners 55">
+                <a:extLst>
+                  <a:ext uri="{FF2B5EF4-FFF2-40B4-BE49-F238E27FC236}">
+                    <a16:creationId xmlns:a16="http://schemas.microsoft.com/office/drawing/2014/main" id="{D5F6220E-2824-40FE-BC96-9C77527501B7}"/>
+                  </a:ext>
+                </a:extLst>
+              </p:cNvPr>
+              <p:cNvSpPr/>
+              <p:nvPr/>
+            </p:nvSpPr>
+            <p:spPr>
+              <a:xfrm>
+                <a:off x="5677976" y="718535"/>
+                <a:ext cx="363935" cy="363935"/>
+              </a:xfrm>
+              <a:prstGeom prst="roundRect">
+                <a:avLst>
+                  <a:gd name="adj" fmla="val 29753"/>
+                </a:avLst>
+              </a:prstGeom>
+              <a:solidFill>
+                <a:srgbClr val="F02311"/>
+              </a:solidFill>
+              <a:ln>
+                <a:solidFill>
+                  <a:schemeClr val="bg2">
+                    <a:lumMod val="50000"/>
+                  </a:schemeClr>
+                </a:solidFill>
+              </a:ln>
+            </p:spPr>
+            <p:style>
+              <a:lnRef idx="2">
+                <a:schemeClr val="accent1">
+                  <a:shade val="50000"/>
+                </a:schemeClr>
+              </a:lnRef>
+              <a:fillRef idx="1">
+                <a:schemeClr val="accent1"/>
+              </a:fillRef>
+              <a:effectRef idx="0">
+                <a:schemeClr val="accent1"/>
+              </a:effectRef>
+              <a:fontRef idx="minor">
+                <a:schemeClr val="lt1"/>
+              </a:fontRef>
+            </p:style>
+            <p:txBody>
+              <a:bodyPr rtlCol="0" anchor="ctr"/>
+              <a:lstStyle/>
+              <a:p>
+                <a:pPr algn="ctr"/>
+                <a:r>
+                  <a:rPr lang="en-US">
+                    <a:latin typeface="Segoe UI Semibold" panose="020B0702040204020203" pitchFamily="34" charset="0"/>
+                    <a:cs typeface="Segoe UI Semibold" panose="020B0702040204020203" pitchFamily="34" charset="0"/>
+                  </a:rPr>
+                  <a:t>+</a:t>
+                </a:r>
+              </a:p>
+            </p:txBody>
+          </p:sp>
+          <p:sp>
+            <p:nvSpPr>
+              <p:cNvPr id="57" name="Rectangle: Rounded Corners 56">
+                <a:extLst>
+                  <a:ext uri="{FF2B5EF4-FFF2-40B4-BE49-F238E27FC236}">
+                    <a16:creationId xmlns:a16="http://schemas.microsoft.com/office/drawing/2014/main" id="{C8139DA5-73C9-4586-BB9B-F270AFBFFAE4}"/>
+                  </a:ext>
+                </a:extLst>
+              </p:cNvPr>
+              <p:cNvSpPr/>
+              <p:nvPr/>
+            </p:nvSpPr>
+            <p:spPr>
+              <a:xfrm>
+                <a:off x="4438881" y="1121812"/>
+                <a:ext cx="363935" cy="363935"/>
+              </a:xfrm>
+              <a:prstGeom prst="roundRect">
+                <a:avLst>
+                  <a:gd name="adj" fmla="val 29753"/>
+                </a:avLst>
+              </a:prstGeom>
+              <a:ln>
+                <a:solidFill>
+                  <a:schemeClr val="bg2">
+                    <a:lumMod val="50000"/>
+                  </a:schemeClr>
+                </a:solidFill>
+              </a:ln>
+            </p:spPr>
+            <p:style>
+              <a:lnRef idx="2">
+                <a:schemeClr val="accent1">
+                  <a:shade val="50000"/>
+                </a:schemeClr>
+              </a:lnRef>
+              <a:fillRef idx="1">
+                <a:schemeClr val="accent1"/>
+              </a:fillRef>
+              <a:effectRef idx="0">
+                <a:schemeClr val="accent1"/>
+              </a:effectRef>
+              <a:fontRef idx="minor">
+                <a:schemeClr val="lt1"/>
+              </a:fontRef>
+            </p:style>
+            <p:txBody>
+              <a:bodyPr rtlCol="0" anchor="ctr"/>
+              <a:lstStyle/>
+              <a:p>
+                <a:pPr algn="ctr"/>
+                <a:r>
+                  <a:rPr lang="en-US">
+                    <a:latin typeface="Segoe UI Semibold" panose="020B0702040204020203" pitchFamily="34" charset="0"/>
+                    <a:cs typeface="Segoe UI Semibold" panose="020B0702040204020203" pitchFamily="34" charset="0"/>
+                  </a:rPr>
+                  <a:t>4</a:t>
+                </a:r>
+              </a:p>
+            </p:txBody>
+          </p:sp>
+          <p:sp>
+            <p:nvSpPr>
+              <p:cNvPr id="58" name="Rectangle: Rounded Corners 57">
+                <a:extLst>
+                  <a:ext uri="{FF2B5EF4-FFF2-40B4-BE49-F238E27FC236}">
+                    <a16:creationId xmlns:a16="http://schemas.microsoft.com/office/drawing/2014/main" id="{559F54A2-1DBA-48C1-B71D-46CF39C57256}"/>
+                  </a:ext>
+                </a:extLst>
+              </p:cNvPr>
+              <p:cNvSpPr/>
+              <p:nvPr/>
+            </p:nvSpPr>
+            <p:spPr>
+              <a:xfrm>
+                <a:off x="4853145" y="1121812"/>
+                <a:ext cx="363935" cy="363935"/>
+              </a:xfrm>
+              <a:prstGeom prst="roundRect">
+                <a:avLst>
+                  <a:gd name="adj" fmla="val 29753"/>
+                </a:avLst>
+              </a:prstGeom>
+              <a:ln>
+                <a:solidFill>
+                  <a:schemeClr val="bg2">
+                    <a:lumMod val="50000"/>
+                  </a:schemeClr>
+                </a:solidFill>
+              </a:ln>
+            </p:spPr>
+            <p:style>
+              <a:lnRef idx="2">
+                <a:schemeClr val="accent1">
+                  <a:shade val="50000"/>
+                </a:schemeClr>
+              </a:lnRef>
+              <a:fillRef idx="1">
+                <a:schemeClr val="accent1"/>
+              </a:fillRef>
+              <a:effectRef idx="0">
+                <a:schemeClr val="accent1"/>
+              </a:effectRef>
+              <a:fontRef idx="minor">
+                <a:schemeClr val="lt1"/>
+              </a:fontRef>
+            </p:style>
+            <p:txBody>
+              <a:bodyPr rtlCol="0" anchor="ctr"/>
+              <a:lstStyle/>
+              <a:p>
+                <a:pPr algn="ctr"/>
+                <a:r>
+                  <a:rPr lang="en-US">
+                    <a:latin typeface="Segoe UI Semibold" panose="020B0702040204020203" pitchFamily="34" charset="0"/>
+                    <a:cs typeface="Segoe UI Semibold" panose="020B0702040204020203" pitchFamily="34" charset="0"/>
+                  </a:rPr>
+                  <a:t>5</a:t>
+                </a:r>
+              </a:p>
+            </p:txBody>
+          </p:sp>
+          <p:sp>
+            <p:nvSpPr>
+              <p:cNvPr id="59" name="Rectangle: Rounded Corners 58">
+                <a:extLst>
+                  <a:ext uri="{FF2B5EF4-FFF2-40B4-BE49-F238E27FC236}">
+                    <a16:creationId xmlns:a16="http://schemas.microsoft.com/office/drawing/2014/main" id="{153BA910-ABD9-4409-A751-30E4C4C7480B}"/>
+                  </a:ext>
+                </a:extLst>
+              </p:cNvPr>
+              <p:cNvSpPr/>
+              <p:nvPr/>
+            </p:nvSpPr>
+            <p:spPr>
+              <a:xfrm>
+                <a:off x="5263712" y="1121812"/>
+                <a:ext cx="363935" cy="363935"/>
+              </a:xfrm>
+              <a:prstGeom prst="roundRect">
+                <a:avLst>
+                  <a:gd name="adj" fmla="val 29753"/>
+                </a:avLst>
+              </a:prstGeom>
+              <a:ln>
+                <a:solidFill>
+                  <a:schemeClr val="bg2">
+                    <a:lumMod val="50000"/>
+                  </a:schemeClr>
+                </a:solidFill>
+              </a:ln>
+            </p:spPr>
+            <p:style>
+              <a:lnRef idx="2">
+                <a:schemeClr val="accent1">
+                  <a:shade val="50000"/>
+                </a:schemeClr>
+              </a:lnRef>
+              <a:fillRef idx="1">
+                <a:schemeClr val="accent1"/>
+              </a:fillRef>
+              <a:effectRef idx="0">
+                <a:schemeClr val="accent1"/>
+              </a:effectRef>
+              <a:fontRef idx="minor">
+                <a:schemeClr val="lt1"/>
+              </a:fontRef>
+            </p:style>
+            <p:txBody>
+              <a:bodyPr rtlCol="0" anchor="ctr"/>
+              <a:lstStyle/>
+              <a:p>
+                <a:pPr algn="ctr"/>
+                <a:r>
+                  <a:rPr lang="en-US">
+                    <a:latin typeface="Segoe UI Semibold" panose="020B0702040204020203" pitchFamily="34" charset="0"/>
+                    <a:cs typeface="Segoe UI Semibold" panose="020B0702040204020203" pitchFamily="34" charset="0"/>
+                  </a:rPr>
+                  <a:t>6</a:t>
+                </a:r>
+              </a:p>
+            </p:txBody>
+          </p:sp>
+          <p:sp>
+            <p:nvSpPr>
+              <p:cNvPr id="60" name="Rectangle: Rounded Corners 59">
+                <a:extLst>
+                  <a:ext uri="{FF2B5EF4-FFF2-40B4-BE49-F238E27FC236}">
+                    <a16:creationId xmlns:a16="http://schemas.microsoft.com/office/drawing/2014/main" id="{A2EB76E8-6FDE-4ADE-A0F2-0788C5A2C1CF}"/>
+                  </a:ext>
+                </a:extLst>
+              </p:cNvPr>
+              <p:cNvSpPr/>
+              <p:nvPr/>
+            </p:nvSpPr>
+            <p:spPr>
+              <a:xfrm>
+                <a:off x="5677976" y="1121812"/>
+                <a:ext cx="363935" cy="363935"/>
+              </a:xfrm>
+              <a:prstGeom prst="roundRect">
+                <a:avLst>
+                  <a:gd name="adj" fmla="val 29753"/>
+                </a:avLst>
+              </a:prstGeom>
+              <a:solidFill>
+                <a:srgbClr val="F02311"/>
+              </a:solidFill>
+              <a:ln>
+                <a:solidFill>
+                  <a:schemeClr val="bg2">
+                    <a:lumMod val="50000"/>
+                  </a:schemeClr>
+                </a:solidFill>
+              </a:ln>
+            </p:spPr>
+            <p:style>
+              <a:lnRef idx="2">
+                <a:schemeClr val="accent1">
+                  <a:shade val="50000"/>
+                </a:schemeClr>
+              </a:lnRef>
+              <a:fillRef idx="1">
+                <a:schemeClr val="accent1"/>
+              </a:fillRef>
+              <a:effectRef idx="0">
+                <a:schemeClr val="accent1"/>
+              </a:effectRef>
+              <a:fontRef idx="minor">
+                <a:schemeClr val="lt1"/>
+              </a:fontRef>
+            </p:style>
+            <p:txBody>
+              <a:bodyPr rtlCol="0" anchor="ctr"/>
+              <a:lstStyle/>
+              <a:p>
+                <a:pPr algn="ctr"/>
+                <a:r>
+                  <a:rPr lang="en-US" dirty="0">
+                    <a:latin typeface="Segoe UI Semibold" panose="020B0702040204020203" pitchFamily="34" charset="0"/>
+                    <a:cs typeface="Segoe UI Semibold" panose="020B0702040204020203" pitchFamily="34" charset="0"/>
+                  </a:rPr>
+                  <a:t>−</a:t>
+                </a:r>
+              </a:p>
+            </p:txBody>
+          </p:sp>
+          <p:sp>
+            <p:nvSpPr>
+              <p:cNvPr id="61" name="Rectangle: Rounded Corners 60">
+                <a:extLst>
+                  <a:ext uri="{FF2B5EF4-FFF2-40B4-BE49-F238E27FC236}">
+                    <a16:creationId xmlns:a16="http://schemas.microsoft.com/office/drawing/2014/main" id="{595EC3EC-D1CB-4D2D-971A-0D9F5CB2203E}"/>
+                  </a:ext>
+                </a:extLst>
+              </p:cNvPr>
+              <p:cNvSpPr/>
+              <p:nvPr/>
+            </p:nvSpPr>
+            <p:spPr>
+              <a:xfrm>
+                <a:off x="4438881" y="1525089"/>
+                <a:ext cx="363935" cy="363935"/>
+              </a:xfrm>
+              <a:prstGeom prst="roundRect">
+                <a:avLst>
+                  <a:gd name="adj" fmla="val 29753"/>
+                </a:avLst>
+              </a:prstGeom>
+              <a:ln>
+                <a:solidFill>
+                  <a:schemeClr val="bg2">
+                    <a:lumMod val="50000"/>
+                  </a:schemeClr>
+                </a:solidFill>
+              </a:ln>
+            </p:spPr>
+            <p:style>
+              <a:lnRef idx="2">
+                <a:schemeClr val="accent1">
+                  <a:shade val="50000"/>
+                </a:schemeClr>
+              </a:lnRef>
+              <a:fillRef idx="1">
+                <a:schemeClr val="accent1"/>
+              </a:fillRef>
+              <a:effectRef idx="0">
+                <a:schemeClr val="accent1"/>
+              </a:effectRef>
+              <a:fontRef idx="minor">
+                <a:schemeClr val="lt1"/>
+              </a:fontRef>
+            </p:style>
+            <p:txBody>
+              <a:bodyPr rtlCol="0" anchor="ctr"/>
+              <a:lstStyle/>
+              <a:p>
+                <a:pPr algn="ctr"/>
+                <a:r>
+                  <a:rPr lang="en-US">
+                    <a:latin typeface="Segoe UI Semibold" panose="020B0702040204020203" pitchFamily="34" charset="0"/>
+                    <a:cs typeface="Segoe UI Semibold" panose="020B0702040204020203" pitchFamily="34" charset="0"/>
+                  </a:rPr>
+                  <a:t>7</a:t>
+                </a:r>
+              </a:p>
+            </p:txBody>
+          </p:sp>
+          <p:sp>
+            <p:nvSpPr>
+              <p:cNvPr id="62" name="Rectangle: Rounded Corners 61">
+                <a:extLst>
+                  <a:ext uri="{FF2B5EF4-FFF2-40B4-BE49-F238E27FC236}">
+                    <a16:creationId xmlns:a16="http://schemas.microsoft.com/office/drawing/2014/main" id="{BD910357-B205-464E-B373-52417F71AC05}"/>
+                  </a:ext>
+                </a:extLst>
+              </p:cNvPr>
+              <p:cNvSpPr/>
+              <p:nvPr/>
+            </p:nvSpPr>
+            <p:spPr>
+              <a:xfrm>
+                <a:off x="4853145" y="1525089"/>
+                <a:ext cx="363935" cy="363935"/>
+              </a:xfrm>
+              <a:prstGeom prst="roundRect">
+                <a:avLst>
+                  <a:gd name="adj" fmla="val 29753"/>
+                </a:avLst>
+              </a:prstGeom>
+              <a:ln>
+                <a:solidFill>
+                  <a:schemeClr val="bg2">
+                    <a:lumMod val="50000"/>
+                  </a:schemeClr>
+                </a:solidFill>
+              </a:ln>
+            </p:spPr>
+            <p:style>
+              <a:lnRef idx="2">
+                <a:schemeClr val="accent1">
+                  <a:shade val="50000"/>
+                </a:schemeClr>
+              </a:lnRef>
+              <a:fillRef idx="1">
+                <a:schemeClr val="accent1"/>
+              </a:fillRef>
+              <a:effectRef idx="0">
+                <a:schemeClr val="accent1"/>
+              </a:effectRef>
+              <a:fontRef idx="minor">
+                <a:schemeClr val="lt1"/>
+              </a:fontRef>
+            </p:style>
+            <p:txBody>
+              <a:bodyPr rtlCol="0" anchor="ctr"/>
+              <a:lstStyle/>
+              <a:p>
+                <a:pPr algn="ctr"/>
+                <a:r>
+                  <a:rPr lang="en-US">
+                    <a:latin typeface="Segoe UI Semibold" panose="020B0702040204020203" pitchFamily="34" charset="0"/>
+                    <a:cs typeface="Segoe UI Semibold" panose="020B0702040204020203" pitchFamily="34" charset="0"/>
+                  </a:rPr>
+                  <a:t>8</a:t>
+                </a:r>
+              </a:p>
+            </p:txBody>
+          </p:sp>
+          <p:sp>
+            <p:nvSpPr>
+              <p:cNvPr id="63" name="Rectangle: Rounded Corners 62">
+                <a:extLst>
+                  <a:ext uri="{FF2B5EF4-FFF2-40B4-BE49-F238E27FC236}">
+                    <a16:creationId xmlns:a16="http://schemas.microsoft.com/office/drawing/2014/main" id="{C35CC4E3-B617-4E4C-8F5F-004C8F3CBBE5}"/>
+                  </a:ext>
+                </a:extLst>
+              </p:cNvPr>
+              <p:cNvSpPr/>
+              <p:nvPr/>
+            </p:nvSpPr>
+            <p:spPr>
+              <a:xfrm>
+                <a:off x="5263712" y="1525089"/>
+                <a:ext cx="363935" cy="363935"/>
+              </a:xfrm>
+              <a:prstGeom prst="roundRect">
+                <a:avLst>
+                  <a:gd name="adj" fmla="val 29753"/>
+                </a:avLst>
+              </a:prstGeom>
+              <a:ln>
+                <a:solidFill>
+                  <a:schemeClr val="bg2">
+                    <a:lumMod val="50000"/>
+                  </a:schemeClr>
+                </a:solidFill>
+              </a:ln>
+            </p:spPr>
+            <p:style>
+              <a:lnRef idx="2">
+                <a:schemeClr val="accent1">
+                  <a:shade val="50000"/>
+                </a:schemeClr>
+              </a:lnRef>
+              <a:fillRef idx="1">
+                <a:schemeClr val="accent1"/>
+              </a:fillRef>
+              <a:effectRef idx="0">
+                <a:schemeClr val="accent1"/>
+              </a:effectRef>
+              <a:fontRef idx="minor">
+                <a:schemeClr val="lt1"/>
+              </a:fontRef>
+            </p:style>
+            <p:txBody>
+              <a:bodyPr rtlCol="0" anchor="ctr"/>
+              <a:lstStyle/>
+              <a:p>
+                <a:pPr algn="ctr"/>
+                <a:r>
+                  <a:rPr lang="en-US">
+                    <a:latin typeface="Segoe UI Semibold" panose="020B0702040204020203" pitchFamily="34" charset="0"/>
+                    <a:cs typeface="Segoe UI Semibold" panose="020B0702040204020203" pitchFamily="34" charset="0"/>
+                  </a:rPr>
+                  <a:t>9</a:t>
+                </a:r>
+              </a:p>
+            </p:txBody>
+          </p:sp>
+          <p:sp>
+            <p:nvSpPr>
+              <p:cNvPr id="64" name="Rectangle: Rounded Corners 63">
+                <a:extLst>
+                  <a:ext uri="{FF2B5EF4-FFF2-40B4-BE49-F238E27FC236}">
+                    <a16:creationId xmlns:a16="http://schemas.microsoft.com/office/drawing/2014/main" id="{48466E73-9A83-4982-A738-05479CF4720E}"/>
+                  </a:ext>
+                </a:extLst>
+              </p:cNvPr>
+              <p:cNvSpPr/>
+              <p:nvPr/>
+            </p:nvSpPr>
+            <p:spPr>
+              <a:xfrm>
+                <a:off x="5677976" y="1525089"/>
+                <a:ext cx="363935" cy="363935"/>
+              </a:xfrm>
+              <a:prstGeom prst="roundRect">
+                <a:avLst>
+                  <a:gd name="adj" fmla="val 29753"/>
+                </a:avLst>
+              </a:prstGeom>
+              <a:solidFill>
+                <a:srgbClr val="F02311"/>
+              </a:solidFill>
+              <a:ln>
+                <a:solidFill>
+                  <a:schemeClr val="bg2">
+                    <a:lumMod val="50000"/>
+                  </a:schemeClr>
+                </a:solidFill>
+              </a:ln>
+            </p:spPr>
+            <p:style>
+              <a:lnRef idx="2">
+                <a:schemeClr val="accent1">
+                  <a:shade val="50000"/>
+                </a:schemeClr>
+              </a:lnRef>
+              <a:fillRef idx="1">
+                <a:schemeClr val="accent1"/>
+              </a:fillRef>
+              <a:effectRef idx="0">
+                <a:schemeClr val="accent1"/>
+              </a:effectRef>
+              <a:fontRef idx="minor">
+                <a:schemeClr val="lt1"/>
+              </a:fontRef>
+            </p:style>
+            <p:txBody>
+              <a:bodyPr rtlCol="0" anchor="ctr"/>
+              <a:lstStyle/>
+              <a:p>
+                <a:pPr algn="ctr"/>
+                <a:r>
+                  <a:rPr lang="en-US">
+                    <a:latin typeface="Segoe UI Semibold" panose="020B0702040204020203" pitchFamily="34" charset="0"/>
+                    <a:cs typeface="Segoe UI Semibold" panose="020B0702040204020203" pitchFamily="34" charset="0"/>
+                  </a:rPr>
+                  <a:t>×</a:t>
+                </a:r>
+              </a:p>
+            </p:txBody>
+          </p:sp>
+          <p:sp>
+            <p:nvSpPr>
+              <p:cNvPr id="65" name="Rectangle: Rounded Corners 64">
+                <a:extLst>
+                  <a:ext uri="{FF2B5EF4-FFF2-40B4-BE49-F238E27FC236}">
+                    <a16:creationId xmlns:a16="http://schemas.microsoft.com/office/drawing/2014/main" id="{33AA1EBC-D22D-42FB-BA3C-AEFC315476D9}"/>
+                  </a:ext>
+                </a:extLst>
+              </p:cNvPr>
+              <p:cNvSpPr/>
+              <p:nvPr/>
+            </p:nvSpPr>
+            <p:spPr>
+              <a:xfrm>
+                <a:off x="4438881" y="1928366"/>
+                <a:ext cx="363935" cy="363935"/>
+              </a:xfrm>
+              <a:prstGeom prst="roundRect">
+                <a:avLst>
+                  <a:gd name="adj" fmla="val 29753"/>
+                </a:avLst>
+              </a:prstGeom>
+              <a:solidFill>
+                <a:srgbClr val="F02311"/>
+              </a:solidFill>
+              <a:ln>
+                <a:solidFill>
+                  <a:schemeClr val="bg2">
+                    <a:lumMod val="50000"/>
+                  </a:schemeClr>
+                </a:solidFill>
+              </a:ln>
+            </p:spPr>
+            <p:style>
+              <a:lnRef idx="2">
+                <a:schemeClr val="accent1">
+                  <a:shade val="50000"/>
+                </a:schemeClr>
+              </a:lnRef>
+              <a:fillRef idx="1">
+                <a:schemeClr val="accent1"/>
+              </a:fillRef>
+              <a:effectRef idx="0">
+                <a:schemeClr val="accent1"/>
+              </a:effectRef>
+              <a:fontRef idx="minor">
+                <a:schemeClr val="lt1"/>
+              </a:fontRef>
+            </p:style>
+            <p:txBody>
+              <a:bodyPr rtlCol="0" anchor="ctr"/>
+              <a:lstStyle/>
+              <a:p>
+                <a:pPr algn="ctr"/>
+                <a:r>
+                  <a:rPr lang="en-US">
+                    <a:latin typeface="Segoe UI Semibold" panose="020B0702040204020203" pitchFamily="34" charset="0"/>
+                    <a:cs typeface="Segoe UI Semibold" panose="020B0702040204020203" pitchFamily="34" charset="0"/>
+                  </a:rPr>
+                  <a:t>←</a:t>
+                </a:r>
+              </a:p>
+            </p:txBody>
+          </p:sp>
+          <p:sp>
+            <p:nvSpPr>
+              <p:cNvPr id="66" name="Rectangle: Rounded Corners 65">
+                <a:extLst>
+                  <a:ext uri="{FF2B5EF4-FFF2-40B4-BE49-F238E27FC236}">
+                    <a16:creationId xmlns:a16="http://schemas.microsoft.com/office/drawing/2014/main" id="{FAC4F557-CAD8-40CF-AA02-124CBAC78458}"/>
+                  </a:ext>
+                </a:extLst>
+              </p:cNvPr>
+              <p:cNvSpPr/>
+              <p:nvPr/>
+            </p:nvSpPr>
+            <p:spPr>
+              <a:xfrm>
+                <a:off x="4853145" y="1928366"/>
+                <a:ext cx="363935" cy="363935"/>
+              </a:xfrm>
+              <a:prstGeom prst="roundRect">
+                <a:avLst>
+                  <a:gd name="adj" fmla="val 29753"/>
+                </a:avLst>
+              </a:prstGeom>
+              <a:ln>
+                <a:solidFill>
+                  <a:schemeClr val="bg2">
+                    <a:lumMod val="50000"/>
+                  </a:schemeClr>
+                </a:solidFill>
+              </a:ln>
+            </p:spPr>
+            <p:style>
+              <a:lnRef idx="2">
+                <a:schemeClr val="accent1">
+                  <a:shade val="50000"/>
+                </a:schemeClr>
+              </a:lnRef>
+              <a:fillRef idx="1">
+                <a:schemeClr val="accent1"/>
+              </a:fillRef>
+              <a:effectRef idx="0">
+                <a:schemeClr val="accent1"/>
+              </a:effectRef>
+              <a:fontRef idx="minor">
+                <a:schemeClr val="lt1"/>
+              </a:fontRef>
+            </p:style>
+            <p:txBody>
+              <a:bodyPr rtlCol="0" anchor="ctr"/>
+              <a:lstStyle/>
+              <a:p>
+                <a:pPr algn="ctr"/>
+                <a:r>
+                  <a:rPr lang="en-US">
+                    <a:latin typeface="Segoe UI Semibold" panose="020B0702040204020203" pitchFamily="34" charset="0"/>
+                    <a:cs typeface="Segoe UI Semibold" panose="020B0702040204020203" pitchFamily="34" charset="0"/>
+                  </a:rPr>
+                  <a:t>0</a:t>
+                </a:r>
+              </a:p>
+            </p:txBody>
+          </p:sp>
+          <p:sp>
+            <p:nvSpPr>
+              <p:cNvPr id="67" name="Rectangle: Rounded Corners 66">
+                <a:extLst>
+                  <a:ext uri="{FF2B5EF4-FFF2-40B4-BE49-F238E27FC236}">
+                    <a16:creationId xmlns:a16="http://schemas.microsoft.com/office/drawing/2014/main" id="{1361B93C-5241-40F5-9B28-053F0C1C49CB}"/>
+                  </a:ext>
+                </a:extLst>
+              </p:cNvPr>
+              <p:cNvSpPr/>
+              <p:nvPr/>
+            </p:nvSpPr>
+            <p:spPr>
+              <a:xfrm>
+                <a:off x="5263712" y="1928366"/>
+                <a:ext cx="363935" cy="363935"/>
+              </a:xfrm>
+              <a:prstGeom prst="roundRect">
+                <a:avLst>
+                  <a:gd name="adj" fmla="val 29753"/>
+                </a:avLst>
+              </a:prstGeom>
+              <a:solidFill>
+                <a:srgbClr val="F02311"/>
+              </a:solidFill>
+              <a:ln>
+                <a:solidFill>
+                  <a:schemeClr val="bg2">
+                    <a:lumMod val="50000"/>
+                  </a:schemeClr>
+                </a:solidFill>
+              </a:ln>
+            </p:spPr>
+            <p:style>
+              <a:lnRef idx="2">
+                <a:schemeClr val="accent1">
+                  <a:shade val="50000"/>
+                </a:schemeClr>
+              </a:lnRef>
+              <a:fillRef idx="1">
+                <a:schemeClr val="accent1"/>
+              </a:fillRef>
+              <a:effectRef idx="0">
+                <a:schemeClr val="accent1"/>
+              </a:effectRef>
+              <a:fontRef idx="minor">
+                <a:schemeClr val="lt1"/>
+              </a:fontRef>
+            </p:style>
+            <p:txBody>
+              <a:bodyPr rtlCol="0" anchor="ctr"/>
+              <a:lstStyle/>
+              <a:p>
+                <a:pPr algn="ctr"/>
+                <a:r>
+                  <a:rPr lang="en-US">
+                    <a:latin typeface="Segoe UI Semibold" panose="020B0702040204020203" pitchFamily="34" charset="0"/>
+                    <a:cs typeface="Segoe UI Semibold" panose="020B0702040204020203" pitchFamily="34" charset="0"/>
+                  </a:rPr>
+                  <a:t>-</a:t>
+                </a:r>
+              </a:p>
+            </p:txBody>
+          </p:sp>
+          <p:sp>
+            <p:nvSpPr>
+              <p:cNvPr id="68" name="Rectangle: Rounded Corners 67">
+                <a:extLst>
+                  <a:ext uri="{FF2B5EF4-FFF2-40B4-BE49-F238E27FC236}">
+                    <a16:creationId xmlns:a16="http://schemas.microsoft.com/office/drawing/2014/main" id="{96A136AE-7D93-4E05-A494-7A08FD89966D}"/>
+                  </a:ext>
+                </a:extLst>
+              </p:cNvPr>
+              <p:cNvSpPr/>
+              <p:nvPr/>
+            </p:nvSpPr>
+            <p:spPr>
+              <a:xfrm>
+                <a:off x="5677976" y="1928366"/>
+                <a:ext cx="363935" cy="363935"/>
+              </a:xfrm>
+              <a:prstGeom prst="roundRect">
+                <a:avLst>
+                  <a:gd name="adj" fmla="val 29753"/>
+                </a:avLst>
+              </a:prstGeom>
+              <a:solidFill>
+                <a:srgbClr val="F02311"/>
+              </a:solidFill>
+              <a:ln>
+                <a:solidFill>
+                  <a:schemeClr val="bg2">
+                    <a:lumMod val="50000"/>
+                  </a:schemeClr>
+                </a:solidFill>
+              </a:ln>
+            </p:spPr>
+            <p:style>
+              <a:lnRef idx="2">
+                <a:schemeClr val="accent1">
+                  <a:shade val="50000"/>
+                </a:schemeClr>
+              </a:lnRef>
+              <a:fillRef idx="1">
+                <a:schemeClr val="accent1"/>
+              </a:fillRef>
+              <a:effectRef idx="0">
+                <a:schemeClr val="accent1"/>
+              </a:effectRef>
+              <a:fontRef idx="minor">
+                <a:schemeClr val="lt1"/>
+              </a:fontRef>
+            </p:style>
+            <p:txBody>
+              <a:bodyPr rtlCol="0" anchor="ctr"/>
+              <a:lstStyle/>
+              <a:p>
+                <a:pPr algn="ctr"/>
+                <a:r>
+                  <a:rPr lang="en-US">
+                    <a:latin typeface="Segoe UI Semibold" panose="020B0702040204020203" pitchFamily="34" charset="0"/>
+                    <a:cs typeface="Segoe UI Semibold" panose="020B0702040204020203" pitchFamily="34" charset="0"/>
+                  </a:rPr>
+                  <a:t>=</a:t>
+                </a:r>
+              </a:p>
+            </p:txBody>
+          </p:sp>
+        </p:grpSp>
+        <p:sp>
+          <p:nvSpPr>
+            <p:cNvPr id="43" name="Rectangle 42">
+              <a:extLst>
+                <a:ext uri="{FF2B5EF4-FFF2-40B4-BE49-F238E27FC236}">
+                  <a16:creationId xmlns:a16="http://schemas.microsoft.com/office/drawing/2014/main" id="{FEC21A17-D715-4EBC-A4A2-86FA05FC3825}"/>
+                </a:ext>
+              </a:extLst>
+            </p:cNvPr>
+            <p:cNvSpPr/>
+            <p:nvPr/>
+          </p:nvSpPr>
+          <p:spPr>
+            <a:xfrm>
+              <a:off x="3266459" y="3558396"/>
+              <a:ext cx="598159" cy="293298"/>
+            </a:xfrm>
+            <a:prstGeom prst="rect">
+              <a:avLst/>
+            </a:prstGeom>
+            <a:solidFill>
+              <a:schemeClr val="tx1"/>
+            </a:solidFill>
+            <a:ln>
+              <a:noFill/>
+            </a:ln>
+          </p:spPr>
+          <p:style>
+            <a:lnRef idx="2">
+              <a:schemeClr val="accent1">
+                <a:shade val="50000"/>
+              </a:schemeClr>
+            </a:lnRef>
+            <a:fillRef idx="1">
+              <a:schemeClr val="accent1"/>
+            </a:fillRef>
+            <a:effectRef idx="0">
+              <a:schemeClr val="accent1"/>
+            </a:effectRef>
+            <a:fontRef idx="minor">
+              <a:schemeClr val="lt1"/>
+            </a:fontRef>
+          </p:style>
+          <p:txBody>
+            <a:bodyPr rtlCol="0" anchor="ctr"/>
+            <a:lstStyle/>
+            <a:p>
+              <a:pPr algn="ctr"/>
+              <a:endParaRPr lang="en-US"/>
+            </a:p>
+          </p:txBody>
+        </p:sp>
+        <p:grpSp>
+          <p:nvGrpSpPr>
+            <p:cNvPr id="44" name="Group 43">
+              <a:extLst>
+                <a:ext uri="{FF2B5EF4-FFF2-40B4-BE49-F238E27FC236}">
+                  <a16:creationId xmlns:a16="http://schemas.microsoft.com/office/drawing/2014/main" id="{BF83D77F-2075-450E-90A6-532B0C9461DB}"/>
+                </a:ext>
+              </a:extLst>
+            </p:cNvPr>
+            <p:cNvGrpSpPr/>
+            <p:nvPr/>
+          </p:nvGrpSpPr>
+          <p:grpSpPr>
+            <a:xfrm>
+              <a:off x="3289142" y="3712720"/>
+              <a:ext cx="552796" cy="119925"/>
+              <a:chOff x="5543045" y="3503169"/>
+              <a:chExt cx="552796" cy="119925"/>
+            </a:xfrm>
+            <a:solidFill>
+              <a:schemeClr val="bg1">
+                <a:lumMod val="65000"/>
+              </a:schemeClr>
+            </a:solidFill>
+          </p:grpSpPr>
+          <p:sp>
+            <p:nvSpPr>
+              <p:cNvPr id="45" name="Rectangle 44">
+                <a:extLst>
+                  <a:ext uri="{FF2B5EF4-FFF2-40B4-BE49-F238E27FC236}">
+                    <a16:creationId xmlns:a16="http://schemas.microsoft.com/office/drawing/2014/main" id="{6973DB1F-08E0-43AC-8397-F73E4DF308A7}"/>
+                  </a:ext>
+                </a:extLst>
+              </p:cNvPr>
+              <p:cNvSpPr/>
+              <p:nvPr/>
+            </p:nvSpPr>
+            <p:spPr>
+              <a:xfrm>
+                <a:off x="5543045" y="3503169"/>
+                <a:ext cx="45719" cy="119925"/>
+              </a:xfrm>
+              <a:prstGeom prst="rect">
+                <a:avLst/>
+              </a:prstGeom>
+              <a:grpFill/>
+              <a:ln>
+                <a:noFill/>
+              </a:ln>
+            </p:spPr>
+            <p:style>
+              <a:lnRef idx="2">
+                <a:schemeClr val="accent1">
+                  <a:shade val="50000"/>
+                </a:schemeClr>
+              </a:lnRef>
+              <a:fillRef idx="1">
+                <a:schemeClr val="accent1"/>
+              </a:fillRef>
+              <a:effectRef idx="0">
+                <a:schemeClr val="accent1"/>
+              </a:effectRef>
+              <a:fontRef idx="minor">
+                <a:schemeClr val="lt1"/>
+              </a:fontRef>
+            </p:style>
+            <p:txBody>
+              <a:bodyPr rtlCol="0" anchor="ctr"/>
+              <a:lstStyle/>
+              <a:p>
+                <a:pPr algn="ctr"/>
+                <a:endParaRPr lang="en-US"/>
+              </a:p>
+            </p:txBody>
+          </p:sp>
+          <p:sp>
+            <p:nvSpPr>
+              <p:cNvPr id="46" name="Rectangle 45">
+                <a:extLst>
+                  <a:ext uri="{FF2B5EF4-FFF2-40B4-BE49-F238E27FC236}">
+                    <a16:creationId xmlns:a16="http://schemas.microsoft.com/office/drawing/2014/main" id="{FEC782F5-5B9D-44DF-BE56-62D06E0BF7DC}"/>
+                  </a:ext>
+                </a:extLst>
+              </p:cNvPr>
+              <p:cNvSpPr/>
+              <p:nvPr/>
+            </p:nvSpPr>
+            <p:spPr>
+              <a:xfrm>
+                <a:off x="5614084" y="3503169"/>
+                <a:ext cx="45719" cy="119925"/>
+              </a:xfrm>
+              <a:prstGeom prst="rect">
+                <a:avLst/>
+              </a:prstGeom>
+              <a:grpFill/>
+              <a:ln>
+                <a:noFill/>
+              </a:ln>
+            </p:spPr>
+            <p:style>
+              <a:lnRef idx="2">
+                <a:schemeClr val="accent1">
+                  <a:shade val="50000"/>
+                </a:schemeClr>
+              </a:lnRef>
+              <a:fillRef idx="1">
+                <a:schemeClr val="accent1"/>
+              </a:fillRef>
+              <a:effectRef idx="0">
+                <a:schemeClr val="accent1"/>
+              </a:effectRef>
+              <a:fontRef idx="minor">
+                <a:schemeClr val="lt1"/>
+              </a:fontRef>
+            </p:style>
+            <p:txBody>
+              <a:bodyPr rtlCol="0" anchor="ctr"/>
+              <a:lstStyle/>
+              <a:p>
+                <a:pPr algn="ctr"/>
+                <a:endParaRPr lang="en-US"/>
+              </a:p>
+            </p:txBody>
+          </p:sp>
+          <p:sp>
+            <p:nvSpPr>
+              <p:cNvPr id="47" name="Rectangle 46">
+                <a:extLst>
+                  <a:ext uri="{FF2B5EF4-FFF2-40B4-BE49-F238E27FC236}">
+                    <a16:creationId xmlns:a16="http://schemas.microsoft.com/office/drawing/2014/main" id="{623B765B-4ABE-4B7F-BD26-0038878B1619}"/>
+                  </a:ext>
+                </a:extLst>
+              </p:cNvPr>
+              <p:cNvSpPr/>
+              <p:nvPr/>
+            </p:nvSpPr>
+            <p:spPr>
+              <a:xfrm>
+                <a:off x="5690025" y="3503169"/>
+                <a:ext cx="45719" cy="119925"/>
+              </a:xfrm>
+              <a:prstGeom prst="rect">
+                <a:avLst/>
+              </a:prstGeom>
+              <a:grpFill/>
+              <a:ln>
+                <a:noFill/>
+              </a:ln>
+            </p:spPr>
+            <p:style>
+              <a:lnRef idx="2">
+                <a:schemeClr val="accent1">
+                  <a:shade val="50000"/>
+                </a:schemeClr>
+              </a:lnRef>
+              <a:fillRef idx="1">
+                <a:schemeClr val="accent1"/>
+              </a:fillRef>
+              <a:effectRef idx="0">
+                <a:schemeClr val="accent1"/>
+              </a:effectRef>
+              <a:fontRef idx="minor">
+                <a:schemeClr val="lt1"/>
+              </a:fontRef>
+            </p:style>
+            <p:txBody>
+              <a:bodyPr rtlCol="0" anchor="ctr"/>
+              <a:lstStyle/>
+              <a:p>
+                <a:pPr algn="ctr"/>
+                <a:endParaRPr lang="en-US"/>
+              </a:p>
+            </p:txBody>
+          </p:sp>
+          <p:sp>
+            <p:nvSpPr>
+              <p:cNvPr id="48" name="Rectangle 47">
+                <a:extLst>
+                  <a:ext uri="{FF2B5EF4-FFF2-40B4-BE49-F238E27FC236}">
+                    <a16:creationId xmlns:a16="http://schemas.microsoft.com/office/drawing/2014/main" id="{E2CDDF85-9CD8-4B50-A0E4-123032960430}"/>
+                  </a:ext>
+                </a:extLst>
+              </p:cNvPr>
+              <p:cNvSpPr/>
+              <p:nvPr/>
+            </p:nvSpPr>
+            <p:spPr>
+              <a:xfrm>
+                <a:off x="5761064" y="3503169"/>
+                <a:ext cx="45719" cy="119925"/>
+              </a:xfrm>
+              <a:prstGeom prst="rect">
+                <a:avLst/>
+              </a:prstGeom>
+              <a:grpFill/>
+              <a:ln>
+                <a:noFill/>
+              </a:ln>
+            </p:spPr>
+            <p:style>
+              <a:lnRef idx="2">
+                <a:schemeClr val="accent1">
+                  <a:shade val="50000"/>
+                </a:schemeClr>
+              </a:lnRef>
+              <a:fillRef idx="1">
+                <a:schemeClr val="accent1"/>
+              </a:fillRef>
+              <a:effectRef idx="0">
+                <a:schemeClr val="accent1"/>
+              </a:effectRef>
+              <a:fontRef idx="minor">
+                <a:schemeClr val="lt1"/>
+              </a:fontRef>
+            </p:style>
+            <p:txBody>
+              <a:bodyPr rtlCol="0" anchor="ctr"/>
+              <a:lstStyle/>
+              <a:p>
+                <a:pPr algn="ctr"/>
+                <a:endParaRPr lang="en-US"/>
+              </a:p>
+            </p:txBody>
+          </p:sp>
+          <p:sp>
+            <p:nvSpPr>
+              <p:cNvPr id="49" name="Rectangle 48">
+                <a:extLst>
+                  <a:ext uri="{FF2B5EF4-FFF2-40B4-BE49-F238E27FC236}">
+                    <a16:creationId xmlns:a16="http://schemas.microsoft.com/office/drawing/2014/main" id="{2C25272E-EC8E-4495-AEA4-5707213541E8}"/>
+                  </a:ext>
+                </a:extLst>
+              </p:cNvPr>
+              <p:cNvSpPr/>
+              <p:nvPr/>
+            </p:nvSpPr>
+            <p:spPr>
+              <a:xfrm>
+                <a:off x="5832103" y="3503169"/>
+                <a:ext cx="45719" cy="119925"/>
+              </a:xfrm>
+              <a:prstGeom prst="rect">
+                <a:avLst/>
+              </a:prstGeom>
+              <a:grpFill/>
+              <a:ln>
+                <a:noFill/>
+              </a:ln>
+            </p:spPr>
+            <p:style>
+              <a:lnRef idx="2">
+                <a:schemeClr val="accent1">
+                  <a:shade val="50000"/>
+                </a:schemeClr>
+              </a:lnRef>
+              <a:fillRef idx="1">
+                <a:schemeClr val="accent1"/>
+              </a:fillRef>
+              <a:effectRef idx="0">
+                <a:schemeClr val="accent1"/>
+              </a:effectRef>
+              <a:fontRef idx="minor">
+                <a:schemeClr val="lt1"/>
+              </a:fontRef>
+            </p:style>
+            <p:txBody>
+              <a:bodyPr rtlCol="0" anchor="ctr"/>
+              <a:lstStyle/>
+              <a:p>
+                <a:pPr algn="ctr"/>
+                <a:endParaRPr lang="en-US"/>
+              </a:p>
+            </p:txBody>
+          </p:sp>
+          <p:sp>
+            <p:nvSpPr>
+              <p:cNvPr id="50" name="Rectangle 49">
+                <a:extLst>
+                  <a:ext uri="{FF2B5EF4-FFF2-40B4-BE49-F238E27FC236}">
+                    <a16:creationId xmlns:a16="http://schemas.microsoft.com/office/drawing/2014/main" id="{283EAAA1-84B1-485C-ACAE-4ED36A1E2121}"/>
+                  </a:ext>
+                </a:extLst>
+              </p:cNvPr>
+              <p:cNvSpPr/>
+              <p:nvPr/>
+            </p:nvSpPr>
+            <p:spPr>
+              <a:xfrm>
+                <a:off x="5903142" y="3503169"/>
+                <a:ext cx="45719" cy="119925"/>
+              </a:xfrm>
+              <a:prstGeom prst="rect">
+                <a:avLst/>
+              </a:prstGeom>
+              <a:grpFill/>
+              <a:ln>
+                <a:noFill/>
+              </a:ln>
+            </p:spPr>
+            <p:style>
+              <a:lnRef idx="2">
+                <a:schemeClr val="accent1">
+                  <a:shade val="50000"/>
+                </a:schemeClr>
+              </a:lnRef>
+              <a:fillRef idx="1">
+                <a:schemeClr val="accent1"/>
+              </a:fillRef>
+              <a:effectRef idx="0">
+                <a:schemeClr val="accent1"/>
+              </a:effectRef>
+              <a:fontRef idx="minor">
+                <a:schemeClr val="lt1"/>
+              </a:fontRef>
+            </p:style>
+            <p:txBody>
+              <a:bodyPr rtlCol="0" anchor="ctr"/>
+              <a:lstStyle/>
+              <a:p>
+                <a:pPr algn="ctr"/>
+                <a:endParaRPr lang="en-US"/>
+              </a:p>
+            </p:txBody>
+          </p:sp>
+          <p:sp>
+            <p:nvSpPr>
+              <p:cNvPr id="51" name="Rectangle 50">
+                <a:extLst>
+                  <a:ext uri="{FF2B5EF4-FFF2-40B4-BE49-F238E27FC236}">
+                    <a16:creationId xmlns:a16="http://schemas.microsoft.com/office/drawing/2014/main" id="{26DDCCEC-BC9A-4DF5-AC43-FB24ABF35B97}"/>
+                  </a:ext>
+                </a:extLst>
+              </p:cNvPr>
+              <p:cNvSpPr/>
+              <p:nvPr/>
+            </p:nvSpPr>
+            <p:spPr>
+              <a:xfrm>
+                <a:off x="5979083" y="3503169"/>
+                <a:ext cx="45719" cy="119925"/>
+              </a:xfrm>
+              <a:prstGeom prst="rect">
+                <a:avLst/>
+              </a:prstGeom>
+              <a:grpFill/>
+              <a:ln>
+                <a:noFill/>
+              </a:ln>
+            </p:spPr>
+            <p:style>
+              <a:lnRef idx="2">
+                <a:schemeClr val="accent1">
+                  <a:shade val="50000"/>
+                </a:schemeClr>
+              </a:lnRef>
+              <a:fillRef idx="1">
+                <a:schemeClr val="accent1"/>
+              </a:fillRef>
+              <a:effectRef idx="0">
+                <a:schemeClr val="accent1"/>
+              </a:effectRef>
+              <a:fontRef idx="minor">
+                <a:schemeClr val="lt1"/>
+              </a:fontRef>
+            </p:style>
+            <p:txBody>
+              <a:bodyPr rtlCol="0" anchor="ctr"/>
+              <a:lstStyle/>
+              <a:p>
+                <a:pPr algn="ctr"/>
+                <a:endParaRPr lang="en-US"/>
+              </a:p>
+            </p:txBody>
+          </p:sp>
+          <p:sp>
+            <p:nvSpPr>
+              <p:cNvPr id="52" name="Rectangle 51">
+                <a:extLst>
+                  <a:ext uri="{FF2B5EF4-FFF2-40B4-BE49-F238E27FC236}">
+                    <a16:creationId xmlns:a16="http://schemas.microsoft.com/office/drawing/2014/main" id="{87E1212F-A3C0-4242-BB77-64BDBED7BBDF}"/>
+                  </a:ext>
+                </a:extLst>
+              </p:cNvPr>
+              <p:cNvSpPr/>
+              <p:nvPr/>
+            </p:nvSpPr>
+            <p:spPr>
+              <a:xfrm>
+                <a:off x="6050122" y="3503169"/>
+                <a:ext cx="45719" cy="119925"/>
+              </a:xfrm>
+              <a:prstGeom prst="rect">
+                <a:avLst/>
+              </a:prstGeom>
+              <a:grpFill/>
+              <a:ln>
+                <a:noFill/>
+              </a:ln>
+            </p:spPr>
+            <p:style>
+              <a:lnRef idx="2">
+                <a:schemeClr val="accent1">
+                  <a:shade val="50000"/>
+                </a:schemeClr>
+              </a:lnRef>
+              <a:fillRef idx="1">
+                <a:schemeClr val="accent1"/>
+              </a:fillRef>
+              <a:effectRef idx="0">
+                <a:schemeClr val="accent1"/>
+              </a:effectRef>
+              <a:fontRef idx="minor">
+                <a:schemeClr val="lt1"/>
+              </a:fontRef>
+            </p:style>
+            <p:txBody>
+              <a:bodyPr rtlCol="0" anchor="ctr"/>
+              <a:lstStyle/>
+              <a:p>
+                <a:pPr algn="ctr"/>
+                <a:endParaRPr lang="en-US"/>
+              </a:p>
+            </p:txBody>
+          </p:sp>
+        </p:grpSp>
+      </p:grpSp>
+      <p:grpSp>
+        <p:nvGrpSpPr>
+          <p:cNvPr id="5" name="Group 4">
+            <a:extLst>
+              <a:ext uri="{FF2B5EF4-FFF2-40B4-BE49-F238E27FC236}">
+                <a16:creationId xmlns:a16="http://schemas.microsoft.com/office/drawing/2014/main" id="{30C952B0-9FD1-4C12-AFE3-3BA6AD781A50}"/>
+              </a:ext>
+            </a:extLst>
+          </p:cNvPr>
+          <p:cNvGrpSpPr/>
+          <p:nvPr/>
+        </p:nvGrpSpPr>
+        <p:grpSpPr>
+          <a:xfrm>
+            <a:off x="1397611" y="378354"/>
+            <a:ext cx="1828800" cy="1203745"/>
+            <a:chOff x="5355006" y="3060700"/>
+            <a:chExt cx="2496095" cy="1203745"/>
+          </a:xfrm>
+        </p:grpSpPr>
+        <p:cxnSp>
+          <p:nvCxnSpPr>
+            <p:cNvPr id="35" name="Straight Connector 34">
+              <a:extLst>
+                <a:ext uri="{FF2B5EF4-FFF2-40B4-BE49-F238E27FC236}">
+                  <a16:creationId xmlns:a16="http://schemas.microsoft.com/office/drawing/2014/main" id="{0DB87159-F5BF-402F-B986-D3E8FE4B0248}"/>
+                </a:ext>
+              </a:extLst>
+            </p:cNvPr>
+            <p:cNvCxnSpPr/>
+            <p:nvPr/>
+          </p:nvCxnSpPr>
+          <p:spPr>
+            <a:xfrm>
+              <a:off x="5355006" y="3060700"/>
+              <a:ext cx="2496095" cy="0"/>
+            </a:xfrm>
+            <a:prstGeom prst="line">
+              <a:avLst/>
+            </a:prstGeom>
+            <a:ln w="63500" cap="rnd">
+              <a:solidFill>
+                <a:srgbClr val="FF0000"/>
+              </a:solidFill>
+            </a:ln>
+          </p:spPr>
+          <p:style>
+            <a:lnRef idx="1">
+              <a:schemeClr val="accent1"/>
+            </a:lnRef>
+            <a:fillRef idx="0">
+              <a:schemeClr val="accent1"/>
+            </a:fillRef>
+            <a:effectRef idx="0">
+              <a:schemeClr val="accent1"/>
+            </a:effectRef>
+            <a:fontRef idx="minor">
+              <a:schemeClr val="tx1"/>
+            </a:fontRef>
+          </p:style>
+        </p:cxnSp>
+        <p:cxnSp>
+          <p:nvCxnSpPr>
+            <p:cNvPr id="36" name="Straight Connector 35">
+              <a:extLst>
+                <a:ext uri="{FF2B5EF4-FFF2-40B4-BE49-F238E27FC236}">
+                  <a16:creationId xmlns:a16="http://schemas.microsoft.com/office/drawing/2014/main" id="{B45C6088-9C55-48CD-B92A-BCABBD49777F}"/>
+                </a:ext>
+              </a:extLst>
+            </p:cNvPr>
+            <p:cNvCxnSpPr/>
+            <p:nvPr/>
+          </p:nvCxnSpPr>
+          <p:spPr>
+            <a:xfrm>
+              <a:off x="5355006" y="3461948"/>
+              <a:ext cx="2496095" cy="0"/>
+            </a:xfrm>
+            <a:prstGeom prst="line">
+              <a:avLst/>
+            </a:prstGeom>
+            <a:ln w="63500" cap="rnd">
+              <a:solidFill>
+                <a:srgbClr val="FF0000"/>
+              </a:solidFill>
+            </a:ln>
+          </p:spPr>
+          <p:style>
+            <a:lnRef idx="1">
+              <a:schemeClr val="accent1"/>
+            </a:lnRef>
+            <a:fillRef idx="0">
+              <a:schemeClr val="accent1"/>
+            </a:fillRef>
+            <a:effectRef idx="0">
+              <a:schemeClr val="accent1"/>
+            </a:effectRef>
+            <a:fontRef idx="minor">
+              <a:schemeClr val="tx1"/>
+            </a:fontRef>
+          </p:style>
+        </p:cxnSp>
+        <p:cxnSp>
+          <p:nvCxnSpPr>
+            <p:cNvPr id="37" name="Straight Connector 36">
+              <a:extLst>
+                <a:ext uri="{FF2B5EF4-FFF2-40B4-BE49-F238E27FC236}">
+                  <a16:creationId xmlns:a16="http://schemas.microsoft.com/office/drawing/2014/main" id="{94B5E93B-200B-4442-A7F8-C067E0203F2E}"/>
+                </a:ext>
+              </a:extLst>
+            </p:cNvPr>
+            <p:cNvCxnSpPr/>
+            <p:nvPr/>
+          </p:nvCxnSpPr>
+          <p:spPr>
+            <a:xfrm>
+              <a:off x="5355006" y="3863196"/>
+              <a:ext cx="2496095" cy="0"/>
+            </a:xfrm>
+            <a:prstGeom prst="line">
+              <a:avLst/>
+            </a:prstGeom>
+            <a:ln w="63500" cap="rnd">
+              <a:solidFill>
+                <a:srgbClr val="FF0000"/>
+              </a:solidFill>
+            </a:ln>
+          </p:spPr>
+          <p:style>
+            <a:lnRef idx="1">
+              <a:schemeClr val="accent1"/>
+            </a:lnRef>
+            <a:fillRef idx="0">
+              <a:schemeClr val="accent1"/>
+            </a:fillRef>
+            <a:effectRef idx="0">
+              <a:schemeClr val="accent1"/>
+            </a:effectRef>
+            <a:fontRef idx="minor">
+              <a:schemeClr val="tx1"/>
+            </a:fontRef>
+          </p:style>
+        </p:cxnSp>
+        <p:cxnSp>
+          <p:nvCxnSpPr>
+            <p:cNvPr id="38" name="Straight Connector 37">
+              <a:extLst>
+                <a:ext uri="{FF2B5EF4-FFF2-40B4-BE49-F238E27FC236}">
+                  <a16:creationId xmlns:a16="http://schemas.microsoft.com/office/drawing/2014/main" id="{A9496596-74DA-4385-92B7-C1A0DB06BF46}"/>
+                </a:ext>
+              </a:extLst>
+            </p:cNvPr>
+            <p:cNvCxnSpPr/>
+            <p:nvPr/>
+          </p:nvCxnSpPr>
+          <p:spPr>
+            <a:xfrm>
+              <a:off x="5355006" y="4264445"/>
+              <a:ext cx="2496095" cy="0"/>
+            </a:xfrm>
+            <a:prstGeom prst="line">
+              <a:avLst/>
+            </a:prstGeom>
+            <a:ln w="63500" cap="rnd">
+              <a:solidFill>
+                <a:srgbClr val="FF0000"/>
+              </a:solidFill>
+            </a:ln>
+          </p:spPr>
+          <p:style>
+            <a:lnRef idx="1">
+              <a:schemeClr val="accent1"/>
+            </a:lnRef>
+            <a:fillRef idx="0">
+              <a:schemeClr val="accent1"/>
+            </a:fillRef>
+            <a:effectRef idx="0">
+              <a:schemeClr val="accent1"/>
+            </a:effectRef>
+            <a:fontRef idx="minor">
+              <a:schemeClr val="tx1"/>
+            </a:fontRef>
+          </p:style>
+        </p:cxnSp>
+      </p:grpSp>
+      <p:grpSp>
+        <p:nvGrpSpPr>
+          <p:cNvPr id="6" name="Group 5">
+            <a:extLst>
+              <a:ext uri="{FF2B5EF4-FFF2-40B4-BE49-F238E27FC236}">
+                <a16:creationId xmlns:a16="http://schemas.microsoft.com/office/drawing/2014/main" id="{5DE9A55F-8F79-4C73-A627-519DB43DB5FC}"/>
+              </a:ext>
+            </a:extLst>
+          </p:cNvPr>
+          <p:cNvGrpSpPr/>
+          <p:nvPr/>
+        </p:nvGrpSpPr>
+        <p:grpSpPr>
+          <a:xfrm rot="5400000">
+            <a:off x="1531617" y="511102"/>
+            <a:ext cx="1828800" cy="1203745"/>
+            <a:chOff x="5355006" y="3060700"/>
+            <a:chExt cx="2496095" cy="1203745"/>
+          </a:xfrm>
+        </p:grpSpPr>
+        <p:cxnSp>
+          <p:nvCxnSpPr>
+            <p:cNvPr id="31" name="Straight Connector 30">
+              <a:extLst>
+                <a:ext uri="{FF2B5EF4-FFF2-40B4-BE49-F238E27FC236}">
+                  <a16:creationId xmlns:a16="http://schemas.microsoft.com/office/drawing/2014/main" id="{9FCC5002-3AD0-4D3C-A895-532392F927F9}"/>
+                </a:ext>
+              </a:extLst>
+            </p:cNvPr>
+            <p:cNvCxnSpPr/>
+            <p:nvPr/>
+          </p:nvCxnSpPr>
+          <p:spPr>
+            <a:xfrm>
+              <a:off x="5355006" y="3060700"/>
+              <a:ext cx="2496095" cy="0"/>
+            </a:xfrm>
+            <a:prstGeom prst="line">
+              <a:avLst/>
+            </a:prstGeom>
+            <a:ln w="63500" cap="rnd">
+              <a:solidFill>
+                <a:srgbClr val="7030A0"/>
+              </a:solidFill>
+            </a:ln>
+          </p:spPr>
+          <p:style>
+            <a:lnRef idx="1">
+              <a:schemeClr val="accent1"/>
+            </a:lnRef>
+            <a:fillRef idx="0">
+              <a:schemeClr val="accent1"/>
+            </a:fillRef>
+            <a:effectRef idx="0">
+              <a:schemeClr val="accent1"/>
+            </a:effectRef>
+            <a:fontRef idx="minor">
+              <a:schemeClr val="tx1"/>
+            </a:fontRef>
+          </p:style>
+        </p:cxnSp>
+        <p:cxnSp>
+          <p:nvCxnSpPr>
+            <p:cNvPr id="32" name="Straight Connector 31">
+              <a:extLst>
+                <a:ext uri="{FF2B5EF4-FFF2-40B4-BE49-F238E27FC236}">
+                  <a16:creationId xmlns:a16="http://schemas.microsoft.com/office/drawing/2014/main" id="{2CC4A7C0-EFE4-4779-A3A2-6C623915DBF4}"/>
+                </a:ext>
+              </a:extLst>
+            </p:cNvPr>
+            <p:cNvCxnSpPr/>
+            <p:nvPr/>
+          </p:nvCxnSpPr>
+          <p:spPr>
+            <a:xfrm>
+              <a:off x="5355006" y="3461948"/>
+              <a:ext cx="2496095" cy="0"/>
+            </a:xfrm>
+            <a:prstGeom prst="line">
+              <a:avLst/>
+            </a:prstGeom>
+            <a:ln w="63500" cap="rnd">
+              <a:solidFill>
+                <a:srgbClr val="7030A0"/>
+              </a:solidFill>
+            </a:ln>
+          </p:spPr>
+          <p:style>
+            <a:lnRef idx="1">
+              <a:schemeClr val="accent1"/>
+            </a:lnRef>
+            <a:fillRef idx="0">
+              <a:schemeClr val="accent1"/>
+            </a:fillRef>
+            <a:effectRef idx="0">
+              <a:schemeClr val="accent1"/>
+            </a:effectRef>
+            <a:fontRef idx="minor">
+              <a:schemeClr val="tx1"/>
+            </a:fontRef>
+          </p:style>
+        </p:cxnSp>
+        <p:cxnSp>
+          <p:nvCxnSpPr>
+            <p:cNvPr id="33" name="Straight Connector 32">
+              <a:extLst>
+                <a:ext uri="{FF2B5EF4-FFF2-40B4-BE49-F238E27FC236}">
+                  <a16:creationId xmlns:a16="http://schemas.microsoft.com/office/drawing/2014/main" id="{2D67411D-ABAF-4193-8DA5-EF538DEFCFF1}"/>
+                </a:ext>
+              </a:extLst>
+            </p:cNvPr>
+            <p:cNvCxnSpPr/>
+            <p:nvPr/>
+          </p:nvCxnSpPr>
+          <p:spPr>
+            <a:xfrm>
+              <a:off x="5355006" y="3863196"/>
+              <a:ext cx="2496095" cy="0"/>
+            </a:xfrm>
+            <a:prstGeom prst="line">
+              <a:avLst/>
+            </a:prstGeom>
+            <a:ln w="63500" cap="rnd">
+              <a:solidFill>
+                <a:srgbClr val="7030A0"/>
+              </a:solidFill>
+            </a:ln>
+          </p:spPr>
+          <p:style>
+            <a:lnRef idx="1">
+              <a:schemeClr val="accent1"/>
+            </a:lnRef>
+            <a:fillRef idx="0">
+              <a:schemeClr val="accent1"/>
+            </a:fillRef>
+            <a:effectRef idx="0">
+              <a:schemeClr val="accent1"/>
+            </a:effectRef>
+            <a:fontRef idx="minor">
+              <a:schemeClr val="tx1"/>
+            </a:fontRef>
+          </p:style>
+        </p:cxnSp>
+        <p:cxnSp>
+          <p:nvCxnSpPr>
+            <p:cNvPr id="34" name="Straight Connector 33">
+              <a:extLst>
+                <a:ext uri="{FF2B5EF4-FFF2-40B4-BE49-F238E27FC236}">
+                  <a16:creationId xmlns:a16="http://schemas.microsoft.com/office/drawing/2014/main" id="{E44C5AB8-6B77-4505-97CA-F64881F3C1FF}"/>
+                </a:ext>
+              </a:extLst>
+            </p:cNvPr>
+            <p:cNvCxnSpPr/>
+            <p:nvPr/>
+          </p:nvCxnSpPr>
+          <p:spPr>
+            <a:xfrm>
+              <a:off x="5355006" y="4264445"/>
+              <a:ext cx="2496095" cy="0"/>
+            </a:xfrm>
+            <a:prstGeom prst="line">
+              <a:avLst/>
+            </a:prstGeom>
+            <a:ln w="63500" cap="rnd">
+              <a:solidFill>
+                <a:srgbClr val="7030A0"/>
+              </a:solidFill>
+            </a:ln>
+          </p:spPr>
+          <p:style>
+            <a:lnRef idx="1">
+              <a:schemeClr val="accent1"/>
+            </a:lnRef>
+            <a:fillRef idx="0">
+              <a:schemeClr val="accent1"/>
+            </a:fillRef>
+            <a:effectRef idx="0">
+              <a:schemeClr val="accent1"/>
+            </a:effectRef>
+            <a:fontRef idx="minor">
+              <a:schemeClr val="tx1"/>
+            </a:fontRef>
+          </p:style>
+        </p:cxnSp>
+      </p:grpSp>
+      <p:sp>
+        <p:nvSpPr>
+          <p:cNvPr id="7" name="Oval 6">
+            <a:extLst>
+              <a:ext uri="{FF2B5EF4-FFF2-40B4-BE49-F238E27FC236}">
+                <a16:creationId xmlns:a16="http://schemas.microsoft.com/office/drawing/2014/main" id="{32AFC34D-2C49-43FF-9CC6-61560AC5DAF6}"/>
+              </a:ext>
+            </a:extLst>
+          </p:cNvPr>
+          <p:cNvSpPr/>
+          <p:nvPr/>
+        </p:nvSpPr>
+        <p:spPr>
+          <a:xfrm>
+            <a:off x="1748616" y="281567"/>
+            <a:ext cx="191058" cy="191058"/>
+          </a:xfrm>
+          <a:prstGeom prst="ellipse">
+            <a:avLst/>
+          </a:prstGeom>
+          <a:noFill/>
+          <a:ln>
+            <a:solidFill>
+              <a:srgbClr val="00B050"/>
+            </a:solidFill>
+          </a:ln>
+        </p:spPr>
+        <p:style>
+          <a:lnRef idx="2">
+            <a:schemeClr val="accent1">
+              <a:shade val="50000"/>
+            </a:schemeClr>
+          </a:lnRef>
+          <a:fillRef idx="1">
+            <a:schemeClr val="accent1"/>
+          </a:fillRef>
+          <a:effectRef idx="0">
+            <a:schemeClr val="accent1"/>
+          </a:effectRef>
+          <a:fontRef idx="minor">
+            <a:schemeClr val="lt1"/>
+          </a:fontRef>
+        </p:style>
+        <p:txBody>
+          <a:bodyPr rtlCol="0" anchor="ctr"/>
+          <a:lstStyle/>
+          <a:p>
+            <a:pPr algn="ctr"/>
+            <a:endParaRPr lang="en-US" sz="1400">
+              <a:latin typeface="Segoe UI" panose="020B0502040204020203" pitchFamily="34" charset="0"/>
+              <a:cs typeface="Segoe UI" panose="020B0502040204020203" pitchFamily="34" charset="0"/>
+            </a:endParaRPr>
+          </a:p>
+        </p:txBody>
+      </p:sp>
+      <p:sp>
+        <p:nvSpPr>
+          <p:cNvPr id="8" name="Oval 7">
+            <a:extLst>
+              <a:ext uri="{FF2B5EF4-FFF2-40B4-BE49-F238E27FC236}">
+                <a16:creationId xmlns:a16="http://schemas.microsoft.com/office/drawing/2014/main" id="{9C578C65-B94B-44CA-8EE8-3D946D67D180}"/>
+              </a:ext>
+            </a:extLst>
+          </p:cNvPr>
+          <p:cNvSpPr/>
+          <p:nvPr/>
+        </p:nvSpPr>
+        <p:spPr>
+          <a:xfrm>
+            <a:off x="2149864" y="281567"/>
+            <a:ext cx="191058" cy="191058"/>
+          </a:xfrm>
+          <a:prstGeom prst="ellipse">
+            <a:avLst/>
+          </a:prstGeom>
+          <a:noFill/>
+          <a:ln>
+            <a:solidFill>
+              <a:srgbClr val="00B050"/>
+            </a:solidFill>
+          </a:ln>
+        </p:spPr>
+        <p:style>
+          <a:lnRef idx="2">
+            <a:schemeClr val="accent1">
+              <a:shade val="50000"/>
+            </a:schemeClr>
+          </a:lnRef>
+          <a:fillRef idx="1">
+            <a:schemeClr val="accent1"/>
+          </a:fillRef>
+          <a:effectRef idx="0">
+            <a:schemeClr val="accent1"/>
+          </a:effectRef>
+          <a:fontRef idx="minor">
+            <a:schemeClr val="lt1"/>
+          </a:fontRef>
+        </p:style>
+        <p:txBody>
+          <a:bodyPr rtlCol="0" anchor="ctr"/>
+          <a:lstStyle/>
+          <a:p>
+            <a:pPr algn="ctr"/>
+            <a:endParaRPr lang="en-US" sz="1400">
+              <a:latin typeface="Segoe UI" panose="020B0502040204020203" pitchFamily="34" charset="0"/>
+              <a:cs typeface="Segoe UI" panose="020B0502040204020203" pitchFamily="34" charset="0"/>
+            </a:endParaRPr>
+          </a:p>
+        </p:txBody>
+      </p:sp>
+      <p:sp>
+        <p:nvSpPr>
+          <p:cNvPr id="9" name="Oval 8">
+            <a:extLst>
+              <a:ext uri="{FF2B5EF4-FFF2-40B4-BE49-F238E27FC236}">
+                <a16:creationId xmlns:a16="http://schemas.microsoft.com/office/drawing/2014/main" id="{ED1E4409-1A48-427A-B23A-E6433F4F01BE}"/>
+              </a:ext>
+            </a:extLst>
+          </p:cNvPr>
+          <p:cNvSpPr/>
+          <p:nvPr/>
+        </p:nvSpPr>
+        <p:spPr>
+          <a:xfrm>
+            <a:off x="2551111" y="281567"/>
+            <a:ext cx="191058" cy="191058"/>
+          </a:xfrm>
+          <a:prstGeom prst="ellipse">
+            <a:avLst/>
+          </a:prstGeom>
+          <a:noFill/>
+          <a:ln>
+            <a:solidFill>
+              <a:srgbClr val="00B050"/>
+            </a:solidFill>
+          </a:ln>
+        </p:spPr>
+        <p:style>
+          <a:lnRef idx="2">
+            <a:schemeClr val="accent1">
+              <a:shade val="50000"/>
+            </a:schemeClr>
+          </a:lnRef>
+          <a:fillRef idx="1">
+            <a:schemeClr val="accent1"/>
+          </a:fillRef>
+          <a:effectRef idx="0">
+            <a:schemeClr val="accent1"/>
+          </a:effectRef>
+          <a:fontRef idx="minor">
+            <a:schemeClr val="lt1"/>
+          </a:fontRef>
+        </p:style>
+        <p:txBody>
+          <a:bodyPr rtlCol="0" anchor="ctr"/>
+          <a:lstStyle/>
+          <a:p>
+            <a:pPr algn="ctr"/>
+            <a:endParaRPr lang="en-US" sz="1400">
+              <a:latin typeface="Segoe UI" panose="020B0502040204020203" pitchFamily="34" charset="0"/>
+              <a:cs typeface="Segoe UI" panose="020B0502040204020203" pitchFamily="34" charset="0"/>
+            </a:endParaRPr>
+          </a:p>
+        </p:txBody>
+      </p:sp>
+      <p:sp>
+        <p:nvSpPr>
+          <p:cNvPr id="10" name="Oval 9">
+            <a:extLst>
+              <a:ext uri="{FF2B5EF4-FFF2-40B4-BE49-F238E27FC236}">
+                <a16:creationId xmlns:a16="http://schemas.microsoft.com/office/drawing/2014/main" id="{8AE38414-7E84-454C-B5A1-3108F5AFF2E6}"/>
+              </a:ext>
+            </a:extLst>
+          </p:cNvPr>
+          <p:cNvSpPr/>
+          <p:nvPr/>
+        </p:nvSpPr>
+        <p:spPr>
+          <a:xfrm>
+            <a:off x="2950719" y="281567"/>
+            <a:ext cx="191058" cy="191058"/>
+          </a:xfrm>
+          <a:prstGeom prst="ellipse">
+            <a:avLst/>
+          </a:prstGeom>
+          <a:noFill/>
+          <a:ln>
+            <a:solidFill>
+              <a:srgbClr val="00B050"/>
+            </a:solidFill>
+          </a:ln>
+        </p:spPr>
+        <p:style>
+          <a:lnRef idx="2">
+            <a:schemeClr val="accent1">
+              <a:shade val="50000"/>
+            </a:schemeClr>
+          </a:lnRef>
+          <a:fillRef idx="1">
+            <a:schemeClr val="accent1"/>
+          </a:fillRef>
+          <a:effectRef idx="0">
+            <a:schemeClr val="accent1"/>
+          </a:effectRef>
+          <a:fontRef idx="minor">
+            <a:schemeClr val="lt1"/>
+          </a:fontRef>
+        </p:style>
+        <p:txBody>
+          <a:bodyPr rtlCol="0" anchor="ctr"/>
+          <a:lstStyle/>
+          <a:p>
+            <a:pPr algn="ctr"/>
+            <a:endParaRPr lang="en-US" sz="1400">
+              <a:latin typeface="Segoe UI" panose="020B0502040204020203" pitchFamily="34" charset="0"/>
+              <a:cs typeface="Segoe UI" panose="020B0502040204020203" pitchFamily="34" charset="0"/>
+            </a:endParaRPr>
+          </a:p>
+        </p:txBody>
+      </p:sp>
+      <p:sp>
+        <p:nvSpPr>
+          <p:cNvPr id="11" name="Oval 10">
+            <a:extLst>
+              <a:ext uri="{FF2B5EF4-FFF2-40B4-BE49-F238E27FC236}">
+                <a16:creationId xmlns:a16="http://schemas.microsoft.com/office/drawing/2014/main" id="{DA1B3F6F-4A5B-4215-8072-66D1E2F3AD9C}"/>
+              </a:ext>
+            </a:extLst>
+          </p:cNvPr>
+          <p:cNvSpPr/>
+          <p:nvPr/>
+        </p:nvSpPr>
+        <p:spPr>
+          <a:xfrm>
+            <a:off x="1748616" y="682814"/>
+            <a:ext cx="191058" cy="191058"/>
+          </a:xfrm>
+          <a:prstGeom prst="ellipse">
+            <a:avLst/>
+          </a:prstGeom>
+          <a:noFill/>
+          <a:ln>
+            <a:solidFill>
+              <a:srgbClr val="00B050"/>
+            </a:solidFill>
+          </a:ln>
+        </p:spPr>
+        <p:style>
+          <a:lnRef idx="2">
+            <a:schemeClr val="accent1">
+              <a:shade val="50000"/>
+            </a:schemeClr>
+          </a:lnRef>
+          <a:fillRef idx="1">
+            <a:schemeClr val="accent1"/>
+          </a:fillRef>
+          <a:effectRef idx="0">
+            <a:schemeClr val="accent1"/>
+          </a:effectRef>
+          <a:fontRef idx="minor">
+            <a:schemeClr val="lt1"/>
+          </a:fontRef>
+        </p:style>
+        <p:txBody>
+          <a:bodyPr rtlCol="0" anchor="ctr"/>
+          <a:lstStyle/>
+          <a:p>
+            <a:pPr algn="ctr"/>
+            <a:endParaRPr lang="en-US" sz="1400">
+              <a:latin typeface="Segoe UI" panose="020B0502040204020203" pitchFamily="34" charset="0"/>
+              <a:cs typeface="Segoe UI" panose="020B0502040204020203" pitchFamily="34" charset="0"/>
+            </a:endParaRPr>
+          </a:p>
+        </p:txBody>
+      </p:sp>
+      <p:sp>
+        <p:nvSpPr>
+          <p:cNvPr id="12" name="Oval 11">
+            <a:extLst>
+              <a:ext uri="{FF2B5EF4-FFF2-40B4-BE49-F238E27FC236}">
+                <a16:creationId xmlns:a16="http://schemas.microsoft.com/office/drawing/2014/main" id="{36FFB755-C325-468D-A777-5E903CB34C99}"/>
+              </a:ext>
+            </a:extLst>
+          </p:cNvPr>
+          <p:cNvSpPr/>
+          <p:nvPr/>
+        </p:nvSpPr>
+        <p:spPr>
+          <a:xfrm>
+            <a:off x="2149864" y="682814"/>
+            <a:ext cx="191058" cy="191058"/>
+          </a:xfrm>
+          <a:prstGeom prst="ellipse">
+            <a:avLst/>
+          </a:prstGeom>
+          <a:noFill/>
+          <a:ln>
+            <a:solidFill>
+              <a:srgbClr val="00B050"/>
+            </a:solidFill>
+          </a:ln>
+        </p:spPr>
+        <p:style>
+          <a:lnRef idx="2">
+            <a:schemeClr val="accent1">
+              <a:shade val="50000"/>
+            </a:schemeClr>
+          </a:lnRef>
+          <a:fillRef idx="1">
+            <a:schemeClr val="accent1"/>
+          </a:fillRef>
+          <a:effectRef idx="0">
+            <a:schemeClr val="accent1"/>
+          </a:effectRef>
+          <a:fontRef idx="minor">
+            <a:schemeClr val="lt1"/>
+          </a:fontRef>
+        </p:style>
+        <p:txBody>
+          <a:bodyPr rtlCol="0" anchor="ctr"/>
+          <a:lstStyle/>
+          <a:p>
+            <a:pPr algn="ctr"/>
+            <a:endParaRPr lang="en-US" sz="1400">
+              <a:latin typeface="Segoe UI" panose="020B0502040204020203" pitchFamily="34" charset="0"/>
+              <a:cs typeface="Segoe UI" panose="020B0502040204020203" pitchFamily="34" charset="0"/>
+            </a:endParaRPr>
+          </a:p>
+        </p:txBody>
+      </p:sp>
+      <p:sp>
+        <p:nvSpPr>
+          <p:cNvPr id="13" name="Oval 12">
+            <a:extLst>
+              <a:ext uri="{FF2B5EF4-FFF2-40B4-BE49-F238E27FC236}">
+                <a16:creationId xmlns:a16="http://schemas.microsoft.com/office/drawing/2014/main" id="{ECF75B74-4C05-46B3-ACE8-104F3945665D}"/>
+              </a:ext>
+            </a:extLst>
+          </p:cNvPr>
+          <p:cNvSpPr/>
+          <p:nvPr/>
+        </p:nvSpPr>
+        <p:spPr>
+          <a:xfrm>
+            <a:off x="2551111" y="682814"/>
+            <a:ext cx="191058" cy="191058"/>
+          </a:xfrm>
+          <a:prstGeom prst="ellipse">
+            <a:avLst/>
+          </a:prstGeom>
+          <a:noFill/>
+          <a:ln>
+            <a:solidFill>
+              <a:srgbClr val="00B050"/>
+            </a:solidFill>
+          </a:ln>
+        </p:spPr>
+        <p:style>
+          <a:lnRef idx="2">
+            <a:schemeClr val="accent1">
+              <a:shade val="50000"/>
+            </a:schemeClr>
+          </a:lnRef>
+          <a:fillRef idx="1">
+            <a:schemeClr val="accent1"/>
+          </a:fillRef>
+          <a:effectRef idx="0">
+            <a:schemeClr val="accent1"/>
+          </a:effectRef>
+          <a:fontRef idx="minor">
+            <a:schemeClr val="lt1"/>
+          </a:fontRef>
+        </p:style>
+        <p:txBody>
+          <a:bodyPr rtlCol="0" anchor="ctr"/>
+          <a:lstStyle/>
+          <a:p>
+            <a:pPr algn="ctr"/>
+            <a:endParaRPr lang="en-US" sz="1400">
+              <a:latin typeface="Segoe UI" panose="020B0502040204020203" pitchFamily="34" charset="0"/>
+              <a:cs typeface="Segoe UI" panose="020B0502040204020203" pitchFamily="34" charset="0"/>
+            </a:endParaRPr>
+          </a:p>
+        </p:txBody>
+      </p:sp>
+      <p:sp>
+        <p:nvSpPr>
+          <p:cNvPr id="14" name="Oval 13">
+            <a:extLst>
+              <a:ext uri="{FF2B5EF4-FFF2-40B4-BE49-F238E27FC236}">
+                <a16:creationId xmlns:a16="http://schemas.microsoft.com/office/drawing/2014/main" id="{502EB7CF-D566-424B-BB13-39641094789A}"/>
+              </a:ext>
+            </a:extLst>
+          </p:cNvPr>
+          <p:cNvSpPr/>
+          <p:nvPr/>
+        </p:nvSpPr>
+        <p:spPr>
+          <a:xfrm>
+            <a:off x="2950719" y="682814"/>
+            <a:ext cx="191058" cy="191058"/>
+          </a:xfrm>
+          <a:prstGeom prst="ellipse">
+            <a:avLst/>
+          </a:prstGeom>
+          <a:noFill/>
+          <a:ln>
+            <a:solidFill>
+              <a:srgbClr val="00B050"/>
+            </a:solidFill>
+          </a:ln>
+        </p:spPr>
+        <p:style>
+          <a:lnRef idx="2">
+            <a:schemeClr val="accent1">
+              <a:shade val="50000"/>
+            </a:schemeClr>
+          </a:lnRef>
+          <a:fillRef idx="1">
+            <a:schemeClr val="accent1"/>
+          </a:fillRef>
+          <a:effectRef idx="0">
+            <a:schemeClr val="accent1"/>
+          </a:effectRef>
+          <a:fontRef idx="minor">
+            <a:schemeClr val="lt1"/>
+          </a:fontRef>
+        </p:style>
+        <p:txBody>
+          <a:bodyPr rtlCol="0" anchor="ctr"/>
+          <a:lstStyle/>
+          <a:p>
+            <a:pPr algn="ctr"/>
+            <a:endParaRPr lang="en-US" sz="1400">
+              <a:latin typeface="Segoe UI" panose="020B0502040204020203" pitchFamily="34" charset="0"/>
+              <a:cs typeface="Segoe UI" panose="020B0502040204020203" pitchFamily="34" charset="0"/>
+            </a:endParaRPr>
+          </a:p>
+        </p:txBody>
+      </p:sp>
+      <p:sp>
+        <p:nvSpPr>
+          <p:cNvPr id="15" name="Oval 14">
+            <a:extLst>
+              <a:ext uri="{FF2B5EF4-FFF2-40B4-BE49-F238E27FC236}">
+                <a16:creationId xmlns:a16="http://schemas.microsoft.com/office/drawing/2014/main" id="{8357BBF3-3151-4344-AFB0-7C99A53D26AB}"/>
+              </a:ext>
+            </a:extLst>
+          </p:cNvPr>
+          <p:cNvSpPr/>
+          <p:nvPr/>
+        </p:nvSpPr>
+        <p:spPr>
+          <a:xfrm>
+            <a:off x="1748616" y="1083484"/>
+            <a:ext cx="191058" cy="191058"/>
+          </a:xfrm>
+          <a:prstGeom prst="ellipse">
+            <a:avLst/>
+          </a:prstGeom>
+          <a:noFill/>
+          <a:ln>
+            <a:solidFill>
+              <a:srgbClr val="00B050"/>
+            </a:solidFill>
+          </a:ln>
+        </p:spPr>
+        <p:style>
+          <a:lnRef idx="2">
+            <a:schemeClr val="accent1">
+              <a:shade val="50000"/>
+            </a:schemeClr>
+          </a:lnRef>
+          <a:fillRef idx="1">
+            <a:schemeClr val="accent1"/>
+          </a:fillRef>
+          <a:effectRef idx="0">
+            <a:schemeClr val="accent1"/>
+          </a:effectRef>
+          <a:fontRef idx="minor">
+            <a:schemeClr val="lt1"/>
+          </a:fontRef>
+        </p:style>
+        <p:txBody>
+          <a:bodyPr rtlCol="0" anchor="ctr"/>
+          <a:lstStyle/>
+          <a:p>
+            <a:pPr algn="ctr"/>
+            <a:endParaRPr lang="en-US" sz="1400">
+              <a:latin typeface="Segoe UI" panose="020B0502040204020203" pitchFamily="34" charset="0"/>
+              <a:cs typeface="Segoe UI" panose="020B0502040204020203" pitchFamily="34" charset="0"/>
+            </a:endParaRPr>
+          </a:p>
+        </p:txBody>
+      </p:sp>
+      <p:sp>
+        <p:nvSpPr>
+          <p:cNvPr id="16" name="Oval 15">
+            <a:extLst>
+              <a:ext uri="{FF2B5EF4-FFF2-40B4-BE49-F238E27FC236}">
+                <a16:creationId xmlns:a16="http://schemas.microsoft.com/office/drawing/2014/main" id="{0948CB54-9E80-4040-9EF1-9E203447602A}"/>
+              </a:ext>
+            </a:extLst>
+          </p:cNvPr>
+          <p:cNvSpPr/>
+          <p:nvPr/>
+        </p:nvSpPr>
+        <p:spPr>
+          <a:xfrm>
+            <a:off x="2149864" y="1083484"/>
+            <a:ext cx="191058" cy="191058"/>
+          </a:xfrm>
+          <a:prstGeom prst="ellipse">
+            <a:avLst/>
+          </a:prstGeom>
+          <a:noFill/>
+          <a:ln>
+            <a:solidFill>
+              <a:srgbClr val="00B050"/>
+            </a:solidFill>
+          </a:ln>
+        </p:spPr>
+        <p:style>
+          <a:lnRef idx="2">
+            <a:schemeClr val="accent1">
+              <a:shade val="50000"/>
+            </a:schemeClr>
+          </a:lnRef>
+          <a:fillRef idx="1">
+            <a:schemeClr val="accent1"/>
+          </a:fillRef>
+          <a:effectRef idx="0">
+            <a:schemeClr val="accent1"/>
+          </a:effectRef>
+          <a:fontRef idx="minor">
+            <a:schemeClr val="lt1"/>
+          </a:fontRef>
+        </p:style>
+        <p:txBody>
+          <a:bodyPr rtlCol="0" anchor="ctr"/>
+          <a:lstStyle/>
+          <a:p>
+            <a:pPr algn="ctr"/>
+            <a:endParaRPr lang="en-US" sz="1400">
+              <a:latin typeface="Segoe UI" panose="020B0502040204020203" pitchFamily="34" charset="0"/>
+              <a:cs typeface="Segoe UI" panose="020B0502040204020203" pitchFamily="34" charset="0"/>
+            </a:endParaRPr>
+          </a:p>
+        </p:txBody>
+      </p:sp>
+      <p:sp>
+        <p:nvSpPr>
+          <p:cNvPr id="17" name="Oval 16">
+            <a:extLst>
+              <a:ext uri="{FF2B5EF4-FFF2-40B4-BE49-F238E27FC236}">
+                <a16:creationId xmlns:a16="http://schemas.microsoft.com/office/drawing/2014/main" id="{E1EB61A7-BBDA-4A2D-9C2A-1EF55DD34A50}"/>
+              </a:ext>
+            </a:extLst>
+          </p:cNvPr>
+          <p:cNvSpPr/>
+          <p:nvPr/>
+        </p:nvSpPr>
+        <p:spPr>
+          <a:xfrm>
+            <a:off x="2551111" y="1083484"/>
+            <a:ext cx="191058" cy="191058"/>
+          </a:xfrm>
+          <a:prstGeom prst="ellipse">
+            <a:avLst/>
+          </a:prstGeom>
+          <a:noFill/>
+          <a:ln>
+            <a:solidFill>
+              <a:srgbClr val="00B050"/>
+            </a:solidFill>
+          </a:ln>
+        </p:spPr>
+        <p:style>
+          <a:lnRef idx="2">
+            <a:schemeClr val="accent1">
+              <a:shade val="50000"/>
+            </a:schemeClr>
+          </a:lnRef>
+          <a:fillRef idx="1">
+            <a:schemeClr val="accent1"/>
+          </a:fillRef>
+          <a:effectRef idx="0">
+            <a:schemeClr val="accent1"/>
+          </a:effectRef>
+          <a:fontRef idx="minor">
+            <a:schemeClr val="lt1"/>
+          </a:fontRef>
+        </p:style>
+        <p:txBody>
+          <a:bodyPr rtlCol="0" anchor="ctr"/>
+          <a:lstStyle/>
+          <a:p>
+            <a:pPr algn="ctr"/>
+            <a:endParaRPr lang="en-US" sz="1400">
+              <a:latin typeface="Segoe UI" panose="020B0502040204020203" pitchFamily="34" charset="0"/>
+              <a:cs typeface="Segoe UI" panose="020B0502040204020203" pitchFamily="34" charset="0"/>
+            </a:endParaRPr>
+          </a:p>
+        </p:txBody>
+      </p:sp>
+      <p:sp>
+        <p:nvSpPr>
+          <p:cNvPr id="18" name="Oval 17">
+            <a:extLst>
+              <a:ext uri="{FF2B5EF4-FFF2-40B4-BE49-F238E27FC236}">
+                <a16:creationId xmlns:a16="http://schemas.microsoft.com/office/drawing/2014/main" id="{F372461A-584C-43CC-8BBA-3F2D11F037BD}"/>
+              </a:ext>
+            </a:extLst>
+          </p:cNvPr>
+          <p:cNvSpPr/>
+          <p:nvPr/>
+        </p:nvSpPr>
+        <p:spPr>
+          <a:xfrm>
+            <a:off x="2950719" y="1083484"/>
+            <a:ext cx="191058" cy="191058"/>
+          </a:xfrm>
+          <a:prstGeom prst="ellipse">
+            <a:avLst/>
+          </a:prstGeom>
+          <a:noFill/>
+          <a:ln>
+            <a:solidFill>
+              <a:srgbClr val="00B050"/>
+            </a:solidFill>
+          </a:ln>
+        </p:spPr>
+        <p:style>
+          <a:lnRef idx="2">
+            <a:schemeClr val="accent1">
+              <a:shade val="50000"/>
+            </a:schemeClr>
+          </a:lnRef>
+          <a:fillRef idx="1">
+            <a:schemeClr val="accent1"/>
+          </a:fillRef>
+          <a:effectRef idx="0">
+            <a:schemeClr val="accent1"/>
+          </a:effectRef>
+          <a:fontRef idx="minor">
+            <a:schemeClr val="lt1"/>
+          </a:fontRef>
+        </p:style>
+        <p:txBody>
+          <a:bodyPr rtlCol="0" anchor="ctr"/>
+          <a:lstStyle/>
+          <a:p>
+            <a:pPr algn="ctr"/>
+            <a:endParaRPr lang="en-US" sz="1400">
+              <a:latin typeface="Segoe UI" panose="020B0502040204020203" pitchFamily="34" charset="0"/>
+              <a:cs typeface="Segoe UI" panose="020B0502040204020203" pitchFamily="34" charset="0"/>
+            </a:endParaRPr>
+          </a:p>
+        </p:txBody>
+      </p:sp>
+      <p:sp>
+        <p:nvSpPr>
+          <p:cNvPr id="19" name="Oval 18">
+            <a:extLst>
+              <a:ext uri="{FF2B5EF4-FFF2-40B4-BE49-F238E27FC236}">
+                <a16:creationId xmlns:a16="http://schemas.microsoft.com/office/drawing/2014/main" id="{2A5BA851-4231-48C7-8BCA-723F5CCC7898}"/>
+              </a:ext>
+            </a:extLst>
+          </p:cNvPr>
+          <p:cNvSpPr/>
+          <p:nvPr/>
+        </p:nvSpPr>
+        <p:spPr>
+          <a:xfrm>
+            <a:off x="1748616" y="1485991"/>
+            <a:ext cx="191058" cy="191058"/>
+          </a:xfrm>
+          <a:prstGeom prst="ellipse">
+            <a:avLst/>
+          </a:prstGeom>
+          <a:noFill/>
+          <a:ln>
+            <a:solidFill>
+              <a:srgbClr val="00B050"/>
+            </a:solidFill>
+          </a:ln>
+        </p:spPr>
+        <p:style>
+          <a:lnRef idx="2">
+            <a:schemeClr val="accent1">
+              <a:shade val="50000"/>
+            </a:schemeClr>
+          </a:lnRef>
+          <a:fillRef idx="1">
+            <a:schemeClr val="accent1"/>
+          </a:fillRef>
+          <a:effectRef idx="0">
+            <a:schemeClr val="accent1"/>
+          </a:effectRef>
+          <a:fontRef idx="minor">
+            <a:schemeClr val="lt1"/>
+          </a:fontRef>
+        </p:style>
+        <p:txBody>
+          <a:bodyPr rtlCol="0" anchor="ctr"/>
+          <a:lstStyle/>
+          <a:p>
+            <a:pPr algn="ctr"/>
+            <a:endParaRPr lang="en-US" sz="1400">
+              <a:latin typeface="Segoe UI" panose="020B0502040204020203" pitchFamily="34" charset="0"/>
+              <a:cs typeface="Segoe UI" panose="020B0502040204020203" pitchFamily="34" charset="0"/>
+            </a:endParaRPr>
+          </a:p>
+        </p:txBody>
+      </p:sp>
+      <p:sp>
+        <p:nvSpPr>
+          <p:cNvPr id="20" name="Oval 19">
+            <a:extLst>
+              <a:ext uri="{FF2B5EF4-FFF2-40B4-BE49-F238E27FC236}">
+                <a16:creationId xmlns:a16="http://schemas.microsoft.com/office/drawing/2014/main" id="{F41079B1-CA3E-477A-8BA0-CEA909CBD744}"/>
+              </a:ext>
+            </a:extLst>
+          </p:cNvPr>
+          <p:cNvSpPr/>
+          <p:nvPr/>
+        </p:nvSpPr>
+        <p:spPr>
+          <a:xfrm>
+            <a:off x="2149864" y="1485991"/>
+            <a:ext cx="191058" cy="191058"/>
+          </a:xfrm>
+          <a:prstGeom prst="ellipse">
+            <a:avLst/>
+          </a:prstGeom>
+          <a:noFill/>
+          <a:ln>
+            <a:solidFill>
+              <a:srgbClr val="00B050"/>
+            </a:solidFill>
+          </a:ln>
+        </p:spPr>
+        <p:style>
+          <a:lnRef idx="2">
+            <a:schemeClr val="accent1">
+              <a:shade val="50000"/>
+            </a:schemeClr>
+          </a:lnRef>
+          <a:fillRef idx="1">
+            <a:schemeClr val="accent1"/>
+          </a:fillRef>
+          <a:effectRef idx="0">
+            <a:schemeClr val="accent1"/>
+          </a:effectRef>
+          <a:fontRef idx="minor">
+            <a:schemeClr val="lt1"/>
+          </a:fontRef>
+        </p:style>
+        <p:txBody>
+          <a:bodyPr rtlCol="0" anchor="ctr"/>
+          <a:lstStyle/>
+          <a:p>
+            <a:pPr algn="ctr"/>
+            <a:endParaRPr lang="en-US" sz="1400">
+              <a:latin typeface="Segoe UI" panose="020B0502040204020203" pitchFamily="34" charset="0"/>
+              <a:cs typeface="Segoe UI" panose="020B0502040204020203" pitchFamily="34" charset="0"/>
+            </a:endParaRPr>
+          </a:p>
+        </p:txBody>
+      </p:sp>
+      <p:sp>
+        <p:nvSpPr>
+          <p:cNvPr id="21" name="Oval 20">
+            <a:extLst>
+              <a:ext uri="{FF2B5EF4-FFF2-40B4-BE49-F238E27FC236}">
+                <a16:creationId xmlns:a16="http://schemas.microsoft.com/office/drawing/2014/main" id="{4A90D69A-14DA-4CB8-A378-E91AB61E77AA}"/>
+              </a:ext>
+            </a:extLst>
+          </p:cNvPr>
+          <p:cNvSpPr/>
+          <p:nvPr/>
+        </p:nvSpPr>
+        <p:spPr>
+          <a:xfrm>
+            <a:off x="2551111" y="1485991"/>
+            <a:ext cx="191058" cy="191058"/>
+          </a:xfrm>
+          <a:prstGeom prst="ellipse">
+            <a:avLst/>
+          </a:prstGeom>
+          <a:noFill/>
+          <a:ln>
+            <a:solidFill>
+              <a:srgbClr val="00B050"/>
+            </a:solidFill>
+          </a:ln>
+        </p:spPr>
+        <p:style>
+          <a:lnRef idx="2">
+            <a:schemeClr val="accent1">
+              <a:shade val="50000"/>
+            </a:schemeClr>
+          </a:lnRef>
+          <a:fillRef idx="1">
+            <a:schemeClr val="accent1"/>
+          </a:fillRef>
+          <a:effectRef idx="0">
+            <a:schemeClr val="accent1"/>
+          </a:effectRef>
+          <a:fontRef idx="minor">
+            <a:schemeClr val="lt1"/>
+          </a:fontRef>
+        </p:style>
+        <p:txBody>
+          <a:bodyPr rtlCol="0" anchor="ctr"/>
+          <a:lstStyle/>
+          <a:p>
+            <a:pPr algn="ctr"/>
+            <a:endParaRPr lang="en-US" sz="1400">
+              <a:latin typeface="Segoe UI" panose="020B0502040204020203" pitchFamily="34" charset="0"/>
+              <a:cs typeface="Segoe UI" panose="020B0502040204020203" pitchFamily="34" charset="0"/>
+            </a:endParaRPr>
+          </a:p>
+        </p:txBody>
+      </p:sp>
+      <p:sp>
+        <p:nvSpPr>
+          <p:cNvPr id="22" name="Oval 21">
+            <a:extLst>
+              <a:ext uri="{FF2B5EF4-FFF2-40B4-BE49-F238E27FC236}">
+                <a16:creationId xmlns:a16="http://schemas.microsoft.com/office/drawing/2014/main" id="{DF91DB0E-98BC-4250-9B8D-CE8597B1DDC8}"/>
+              </a:ext>
+            </a:extLst>
+          </p:cNvPr>
+          <p:cNvSpPr/>
+          <p:nvPr/>
+        </p:nvSpPr>
+        <p:spPr>
+          <a:xfrm>
+            <a:off x="2950719" y="1485991"/>
+            <a:ext cx="191058" cy="191058"/>
+          </a:xfrm>
+          <a:prstGeom prst="ellipse">
+            <a:avLst/>
+          </a:prstGeom>
+          <a:noFill/>
+          <a:ln>
+            <a:solidFill>
+              <a:srgbClr val="00B050"/>
+            </a:solidFill>
+          </a:ln>
+        </p:spPr>
+        <p:style>
+          <a:lnRef idx="2">
+            <a:schemeClr val="accent1">
+              <a:shade val="50000"/>
+            </a:schemeClr>
+          </a:lnRef>
+          <a:fillRef idx="1">
+            <a:schemeClr val="accent1"/>
+          </a:fillRef>
+          <a:effectRef idx="0">
+            <a:schemeClr val="accent1"/>
+          </a:effectRef>
+          <a:fontRef idx="minor">
+            <a:schemeClr val="lt1"/>
+          </a:fontRef>
+        </p:style>
+        <p:txBody>
+          <a:bodyPr rtlCol="0" anchor="ctr"/>
+          <a:lstStyle/>
+          <a:p>
+            <a:pPr algn="ctr"/>
+            <a:endParaRPr lang="en-US" sz="1400">
+              <a:latin typeface="Segoe UI" panose="020B0502040204020203" pitchFamily="34" charset="0"/>
+              <a:cs typeface="Segoe UI" panose="020B0502040204020203" pitchFamily="34" charset="0"/>
+            </a:endParaRPr>
+          </a:p>
+        </p:txBody>
+      </p:sp>
+      <p:sp>
+        <p:nvSpPr>
+          <p:cNvPr id="23" name="TextBox 22">
+            <a:extLst>
+              <a:ext uri="{FF2B5EF4-FFF2-40B4-BE49-F238E27FC236}">
+                <a16:creationId xmlns:a16="http://schemas.microsoft.com/office/drawing/2014/main" id="{45F669A9-27F4-436B-987D-8757C32B3E2E}"/>
+              </a:ext>
+            </a:extLst>
+          </p:cNvPr>
+          <p:cNvSpPr txBox="1"/>
+          <p:nvPr/>
+        </p:nvSpPr>
+        <p:spPr>
+          <a:xfrm>
+            <a:off x="714969" y="216194"/>
+            <a:ext cx="771365" cy="307777"/>
+          </a:xfrm>
+          <a:prstGeom prst="rect">
+            <a:avLst/>
+          </a:prstGeom>
+          <a:noFill/>
+        </p:spPr>
+        <p:txBody>
+          <a:bodyPr wrap="none" rtlCol="0">
+            <a:spAutoFit/>
+          </a:bodyPr>
+          <a:lstStyle/>
+          <a:p>
+            <a:r>
+              <a:rPr lang="en-US" sz="1400" b="1" dirty="0">
+                <a:solidFill>
+                  <a:srgbClr val="FF0000"/>
+                </a:solidFill>
+                <a:latin typeface="Anonymous Pro" panose="02060609030202000504" pitchFamily="49" charset="0"/>
+                <a:ea typeface="Anonymous Pro" panose="02060609030202000504" pitchFamily="49" charset="0"/>
+                <a:cs typeface="Segoe UI" panose="020B0502040204020203" pitchFamily="34" charset="0"/>
+              </a:rPr>
+              <a:t>X1[A0]</a:t>
+            </a:r>
+          </a:p>
+        </p:txBody>
+      </p:sp>
+      <p:sp>
+        <p:nvSpPr>
+          <p:cNvPr id="24" name="TextBox 23">
+            <a:extLst>
+              <a:ext uri="{FF2B5EF4-FFF2-40B4-BE49-F238E27FC236}">
+                <a16:creationId xmlns:a16="http://schemas.microsoft.com/office/drawing/2014/main" id="{BC7C8C7D-8220-4FCF-B763-4CDD0308D076}"/>
+              </a:ext>
+            </a:extLst>
+          </p:cNvPr>
+          <p:cNvSpPr txBox="1"/>
+          <p:nvPr/>
+        </p:nvSpPr>
+        <p:spPr>
+          <a:xfrm>
+            <a:off x="714969" y="617441"/>
+            <a:ext cx="771365" cy="307777"/>
+          </a:xfrm>
+          <a:prstGeom prst="rect">
+            <a:avLst/>
+          </a:prstGeom>
+          <a:noFill/>
+        </p:spPr>
+        <p:txBody>
+          <a:bodyPr wrap="none" rtlCol="0">
+            <a:spAutoFit/>
+          </a:bodyPr>
+          <a:lstStyle/>
+          <a:p>
+            <a:r>
+              <a:rPr lang="en-US" sz="1400" b="1" dirty="0">
+                <a:solidFill>
+                  <a:srgbClr val="FF0000"/>
+                </a:solidFill>
+                <a:latin typeface="Anonymous Pro" panose="02060609030202000504" pitchFamily="49" charset="0"/>
+                <a:ea typeface="Anonymous Pro" panose="02060609030202000504" pitchFamily="49" charset="0"/>
+                <a:cs typeface="Segoe UI" panose="020B0502040204020203" pitchFamily="34" charset="0"/>
+              </a:rPr>
+              <a:t>X2[A1]</a:t>
+            </a:r>
+          </a:p>
+        </p:txBody>
+      </p:sp>
+      <p:sp>
+        <p:nvSpPr>
+          <p:cNvPr id="25" name="TextBox 24">
+            <a:extLst>
+              <a:ext uri="{FF2B5EF4-FFF2-40B4-BE49-F238E27FC236}">
+                <a16:creationId xmlns:a16="http://schemas.microsoft.com/office/drawing/2014/main" id="{A0E95216-15CE-4099-909C-A225D2BE9452}"/>
+              </a:ext>
+            </a:extLst>
+          </p:cNvPr>
+          <p:cNvSpPr txBox="1"/>
+          <p:nvPr/>
+        </p:nvSpPr>
+        <p:spPr>
+          <a:xfrm>
+            <a:off x="714969" y="1012780"/>
+            <a:ext cx="771365" cy="307777"/>
+          </a:xfrm>
+          <a:prstGeom prst="rect">
+            <a:avLst/>
+          </a:prstGeom>
+          <a:noFill/>
+        </p:spPr>
+        <p:txBody>
+          <a:bodyPr wrap="none" rtlCol="0">
+            <a:spAutoFit/>
+          </a:bodyPr>
+          <a:lstStyle/>
+          <a:p>
+            <a:r>
+              <a:rPr lang="en-US" sz="1400" b="1" dirty="0">
+                <a:solidFill>
+                  <a:srgbClr val="FF0000"/>
+                </a:solidFill>
+                <a:latin typeface="Anonymous Pro" panose="02060609030202000504" pitchFamily="49" charset="0"/>
+                <a:ea typeface="Anonymous Pro" panose="02060609030202000504" pitchFamily="49" charset="0"/>
+                <a:cs typeface="Segoe UI" panose="020B0502040204020203" pitchFamily="34" charset="0"/>
+              </a:rPr>
+              <a:t>X3[A2]</a:t>
+            </a:r>
+          </a:p>
+        </p:txBody>
+      </p:sp>
+      <p:sp>
+        <p:nvSpPr>
+          <p:cNvPr id="26" name="TextBox 25">
+            <a:extLst>
+              <a:ext uri="{FF2B5EF4-FFF2-40B4-BE49-F238E27FC236}">
+                <a16:creationId xmlns:a16="http://schemas.microsoft.com/office/drawing/2014/main" id="{99B3DACA-58FD-4EAD-BC7C-7D2EABAC0C6F}"/>
+              </a:ext>
+            </a:extLst>
+          </p:cNvPr>
+          <p:cNvSpPr txBox="1"/>
+          <p:nvPr/>
+        </p:nvSpPr>
+        <p:spPr>
+          <a:xfrm>
+            <a:off x="714969" y="1415335"/>
+            <a:ext cx="771365" cy="307777"/>
+          </a:xfrm>
+          <a:prstGeom prst="rect">
+            <a:avLst/>
+          </a:prstGeom>
+          <a:noFill/>
+        </p:spPr>
+        <p:txBody>
+          <a:bodyPr wrap="none" rtlCol="0">
+            <a:spAutoFit/>
+          </a:bodyPr>
+          <a:lstStyle/>
+          <a:p>
+            <a:r>
+              <a:rPr lang="en-US" sz="1400" b="1" dirty="0">
+                <a:solidFill>
+                  <a:srgbClr val="FF0000"/>
+                </a:solidFill>
+                <a:latin typeface="Anonymous Pro" panose="02060609030202000504" pitchFamily="49" charset="0"/>
+                <a:ea typeface="Anonymous Pro" panose="02060609030202000504" pitchFamily="49" charset="0"/>
+                <a:cs typeface="Segoe UI" panose="020B0502040204020203" pitchFamily="34" charset="0"/>
+              </a:rPr>
+              <a:t>X4[A3]</a:t>
+            </a:r>
+          </a:p>
+        </p:txBody>
+      </p:sp>
+      <p:sp>
+        <p:nvSpPr>
+          <p:cNvPr id="27" name="TextBox 26">
+            <a:extLst>
+              <a:ext uri="{FF2B5EF4-FFF2-40B4-BE49-F238E27FC236}">
+                <a16:creationId xmlns:a16="http://schemas.microsoft.com/office/drawing/2014/main" id="{D7EB6F6E-8919-4D4E-8769-2772CEFB84F6}"/>
+              </a:ext>
+            </a:extLst>
+          </p:cNvPr>
+          <p:cNvSpPr txBox="1"/>
+          <p:nvPr/>
+        </p:nvSpPr>
+        <p:spPr>
+          <a:xfrm>
+            <a:off x="1631569" y="1980482"/>
+            <a:ext cx="400110" cy="679032"/>
+          </a:xfrm>
+          <a:prstGeom prst="rect">
+            <a:avLst/>
+          </a:prstGeom>
+          <a:noFill/>
+        </p:spPr>
+        <p:txBody>
+          <a:bodyPr vert="vert270" wrap="none" rtlCol="0">
+            <a:spAutoFit/>
+          </a:bodyPr>
+          <a:lstStyle/>
+          <a:p>
+            <a:r>
+              <a:rPr lang="en-US" sz="1400" b="1" dirty="0">
+                <a:solidFill>
+                  <a:srgbClr val="7030A0"/>
+                </a:solidFill>
+                <a:latin typeface="Anonymous Pro" panose="02060609030202000504" pitchFamily="49" charset="0"/>
+                <a:ea typeface="Anonymous Pro" panose="02060609030202000504" pitchFamily="49" charset="0"/>
+                <a:cs typeface="Segoe UI" panose="020B0502040204020203" pitchFamily="34" charset="0"/>
+              </a:rPr>
+              <a:t>Y1[A4]</a:t>
+            </a:r>
+          </a:p>
+        </p:txBody>
+      </p:sp>
+      <p:sp>
+        <p:nvSpPr>
+          <p:cNvPr id="28" name="TextBox 27">
+            <a:extLst>
+              <a:ext uri="{FF2B5EF4-FFF2-40B4-BE49-F238E27FC236}">
+                <a16:creationId xmlns:a16="http://schemas.microsoft.com/office/drawing/2014/main" id="{9703A9E3-0BA9-4F9E-81E4-C3C131F693B8}"/>
+              </a:ext>
+            </a:extLst>
+          </p:cNvPr>
+          <p:cNvSpPr txBox="1"/>
+          <p:nvPr/>
+        </p:nvSpPr>
+        <p:spPr>
+          <a:xfrm>
+            <a:off x="2025433" y="1980482"/>
+            <a:ext cx="400110" cy="679032"/>
+          </a:xfrm>
+          <a:prstGeom prst="rect">
+            <a:avLst/>
+          </a:prstGeom>
+          <a:noFill/>
+        </p:spPr>
+        <p:txBody>
+          <a:bodyPr vert="vert270" wrap="none" rtlCol="0">
+            <a:spAutoFit/>
+          </a:bodyPr>
+          <a:lstStyle/>
+          <a:p>
+            <a:r>
+              <a:rPr lang="en-US" sz="1400" b="1" dirty="0">
+                <a:solidFill>
+                  <a:srgbClr val="7030A0"/>
+                </a:solidFill>
+                <a:latin typeface="Anonymous Pro" panose="02060609030202000504" pitchFamily="49" charset="0"/>
+                <a:ea typeface="Anonymous Pro" panose="02060609030202000504" pitchFamily="49" charset="0"/>
+                <a:cs typeface="Segoe UI" panose="020B0502040204020203" pitchFamily="34" charset="0"/>
+              </a:rPr>
+              <a:t>Y2[A5]</a:t>
+            </a:r>
+          </a:p>
+        </p:txBody>
+      </p:sp>
+      <p:sp>
+        <p:nvSpPr>
+          <p:cNvPr id="29" name="TextBox 28">
+            <a:extLst>
+              <a:ext uri="{FF2B5EF4-FFF2-40B4-BE49-F238E27FC236}">
+                <a16:creationId xmlns:a16="http://schemas.microsoft.com/office/drawing/2014/main" id="{63B7AD9D-BB57-41F2-B35B-10EC04C93A63}"/>
+              </a:ext>
+            </a:extLst>
+          </p:cNvPr>
+          <p:cNvSpPr txBox="1"/>
+          <p:nvPr/>
+        </p:nvSpPr>
+        <p:spPr>
+          <a:xfrm>
+            <a:off x="2431555" y="1980482"/>
+            <a:ext cx="400110" cy="679032"/>
+          </a:xfrm>
+          <a:prstGeom prst="rect">
+            <a:avLst/>
+          </a:prstGeom>
+          <a:noFill/>
+        </p:spPr>
+        <p:txBody>
+          <a:bodyPr vert="vert270" wrap="none" rtlCol="0">
+            <a:spAutoFit/>
+          </a:bodyPr>
+          <a:lstStyle/>
+          <a:p>
+            <a:r>
+              <a:rPr lang="en-US" sz="1400" b="1" dirty="0">
+                <a:solidFill>
+                  <a:srgbClr val="7030A0"/>
+                </a:solidFill>
+                <a:latin typeface="Anonymous Pro" panose="02060609030202000504" pitchFamily="49" charset="0"/>
+                <a:ea typeface="Anonymous Pro" panose="02060609030202000504" pitchFamily="49" charset="0"/>
+                <a:cs typeface="Segoe UI" panose="020B0502040204020203" pitchFamily="34" charset="0"/>
+              </a:rPr>
+              <a:t>Y3[A6]</a:t>
+            </a:r>
+          </a:p>
+        </p:txBody>
+      </p:sp>
+      <p:sp>
+        <p:nvSpPr>
+          <p:cNvPr id="30" name="TextBox 29">
+            <a:extLst>
+              <a:ext uri="{FF2B5EF4-FFF2-40B4-BE49-F238E27FC236}">
+                <a16:creationId xmlns:a16="http://schemas.microsoft.com/office/drawing/2014/main" id="{12AE2DDB-2972-448F-8FEC-A85F1710C95E}"/>
+              </a:ext>
+            </a:extLst>
+          </p:cNvPr>
+          <p:cNvSpPr txBox="1"/>
+          <p:nvPr/>
+        </p:nvSpPr>
+        <p:spPr>
+          <a:xfrm>
+            <a:off x="2827932" y="1980482"/>
+            <a:ext cx="400110" cy="679032"/>
+          </a:xfrm>
+          <a:prstGeom prst="rect">
+            <a:avLst/>
+          </a:prstGeom>
+          <a:noFill/>
+        </p:spPr>
+        <p:txBody>
+          <a:bodyPr vert="vert270" wrap="none" rtlCol="0">
+            <a:spAutoFit/>
+          </a:bodyPr>
+          <a:lstStyle/>
+          <a:p>
+            <a:r>
+              <a:rPr lang="en-US" sz="1400" b="1" dirty="0">
+                <a:solidFill>
+                  <a:srgbClr val="7030A0"/>
+                </a:solidFill>
+                <a:latin typeface="Anonymous Pro" panose="02060609030202000504" pitchFamily="49" charset="0"/>
+                <a:ea typeface="Anonymous Pro" panose="02060609030202000504" pitchFamily="49" charset="0"/>
+                <a:cs typeface="Segoe UI" panose="020B0502040204020203" pitchFamily="34" charset="0"/>
+              </a:rPr>
+              <a:t>Y4[A7]</a:t>
+            </a:r>
+          </a:p>
+        </p:txBody>
+      </p:sp>
+      <p:pic>
+        <p:nvPicPr>
+          <p:cNvPr id="88" name="Graphic 87" descr="Right pointing backhand index with solid fill">
+            <a:extLst>
+              <a:ext uri="{FF2B5EF4-FFF2-40B4-BE49-F238E27FC236}">
+                <a16:creationId xmlns:a16="http://schemas.microsoft.com/office/drawing/2014/main" id="{676DDFC1-E9D5-4E19-80D3-71DFC2E745BE}"/>
+              </a:ext>
+            </a:extLst>
+          </p:cNvPr>
+          <p:cNvPicPr>
+            <a:picLocks noChangeAspect="1"/>
+          </p:cNvPicPr>
+          <p:nvPr/>
+        </p:nvPicPr>
+        <p:blipFill>
+          <a:blip r:embed="rId2">
+            <a:extLst>
+              <a:ext uri="{28A0092B-C50C-407E-A947-70E740481C1C}">
+                <a14:useLocalDpi xmlns:a14="http://schemas.microsoft.com/office/drawing/2010/main" val="0"/>
+              </a:ext>
+              <a:ext uri="{96DAC541-7B7A-43D3-8B79-37D633B846F1}">
+                <asvg:svgBlip xmlns:asvg="http://schemas.microsoft.com/office/drawing/2016/SVG/main" r:embed="rId3"/>
+              </a:ext>
+            </a:extLst>
+          </a:blip>
+          <a:stretch>
+            <a:fillRect/>
+          </a:stretch>
+        </p:blipFill>
+        <p:spPr>
+          <a:xfrm rot="14572677">
+            <a:off x="3444813" y="321448"/>
+            <a:ext cx="710404" cy="710404"/>
+          </a:xfrm>
+          <a:prstGeom prst="rect">
+            <a:avLst/>
+          </a:prstGeom>
+        </p:spPr>
+      </p:pic>
+    </p:spTree>
+    <p:extLst>
+      <p:ext uri="{BB962C8B-B14F-4D97-AF65-F5344CB8AC3E}">
+        <p14:creationId xmlns:p14="http://schemas.microsoft.com/office/powerpoint/2010/main" val="4015527007"/>
+      </p:ext>
+    </p:extLst>
+  </p:cSld>
+  <p:clrMapOvr>
+    <a:masterClrMapping/>
+  </p:clrMapOvr>
+</p:sld>
+</file>
+
 <file path=ppt/theme/theme1.xml><?xml version="1.0" encoding="utf-8"?>
 <a:theme xmlns:a="http://schemas.openxmlformats.org/drawingml/2006/main" name="Office Theme">
   <a:themeElements>

</xml_diff>